<commit_message>
add page 18 in Lab11.pptx
</commit_message>
<xml_diff>
--- a/week11/Lab11.pptx
+++ b/week11/Lab11.pptx
@@ -5,33 +5,34 @@
     <p:sldMasterId id="2147483648" r:id="rId1"/>
   </p:sldMasterIdLst>
   <p:notesMasterIdLst>
-    <p:notesMasterId r:id="rId6"/>
+    <p:notesMasterId r:id="rId27"/>
   </p:notesMasterIdLst>
   <p:sldIdLst>
-    <p:sldId id="256" r:id="rId3"/>
-    <p:sldId id="477" r:id="rId4"/>
-    <p:sldId id="435" r:id="rId5"/>
-    <p:sldId id="1089" r:id="rId7"/>
-    <p:sldId id="1086" r:id="rId8"/>
-    <p:sldId id="259" r:id="rId9"/>
-    <p:sldId id="1090" r:id="rId10"/>
-    <p:sldId id="430" r:id="rId11"/>
-    <p:sldId id="342" r:id="rId12"/>
-    <p:sldId id="434" r:id="rId13"/>
-    <p:sldId id="416" r:id="rId14"/>
-    <p:sldId id="343" r:id="rId15"/>
-    <p:sldId id="437" r:id="rId16"/>
-    <p:sldId id="438" r:id="rId17"/>
-    <p:sldId id="1091" r:id="rId18"/>
-    <p:sldId id="1092" r:id="rId19"/>
-    <p:sldId id="422" r:id="rId20"/>
-    <p:sldId id="1104" r:id="rId21"/>
-    <p:sldId id="1105" r:id="rId22"/>
-    <p:sldId id="1108" r:id="rId23"/>
-    <p:sldId id="1106" r:id="rId24"/>
-    <p:sldId id="1107" r:id="rId25"/>
-    <p:sldId id="1109" r:id="rId26"/>
-    <p:sldId id="1065" r:id="rId27"/>
+    <p:sldId id="256" r:id="rId2"/>
+    <p:sldId id="477" r:id="rId3"/>
+    <p:sldId id="435" r:id="rId4"/>
+    <p:sldId id="1089" r:id="rId5"/>
+    <p:sldId id="1086" r:id="rId6"/>
+    <p:sldId id="259" r:id="rId7"/>
+    <p:sldId id="1090" r:id="rId8"/>
+    <p:sldId id="430" r:id="rId9"/>
+    <p:sldId id="342" r:id="rId10"/>
+    <p:sldId id="434" r:id="rId11"/>
+    <p:sldId id="416" r:id="rId12"/>
+    <p:sldId id="343" r:id="rId13"/>
+    <p:sldId id="437" r:id="rId14"/>
+    <p:sldId id="438" r:id="rId15"/>
+    <p:sldId id="1091" r:id="rId16"/>
+    <p:sldId id="1092" r:id="rId17"/>
+    <p:sldId id="422" r:id="rId18"/>
+    <p:sldId id="1110" r:id="rId19"/>
+    <p:sldId id="1104" r:id="rId20"/>
+    <p:sldId id="1105" r:id="rId21"/>
+    <p:sldId id="1108" r:id="rId22"/>
+    <p:sldId id="1106" r:id="rId23"/>
+    <p:sldId id="1107" r:id="rId24"/>
+    <p:sldId id="1109" r:id="rId25"/>
+    <p:sldId id="1065" r:id="rId26"/>
   </p:sldIdLst>
   <p:sldSz cx="12192000" cy="6858000"/>
   <p:notesSz cx="6858000" cy="9144000"/>
@@ -130,6 +131,11 @@
       </a:defRPr>
     </a:lvl9pPr>
   </p:defaultTextStyle>
+  <p:extLst>
+    <p:ext uri="{EFAFB233-063F-42B5-8137-9DF3F51BA10A}">
+      <p15:sldGuideLst xmlns:p15="http://schemas.microsoft.com/office/powerpoint/2012/main"/>
+    </p:ext>
+  </p:extLst>
 </p:presentation>
 </file>
 
@@ -215,6 +221,7 @@
           <a:p>
             <a:fld id="{D1237EF7-A117-46B7-88A8-1B7FB98FF0F2}" type="datetimeFigureOut">
               <a:rPr lang="zh-CN" altLang="en-US" smtClean="0"/>
+              <a:t>2021/11/20</a:t>
             </a:fld>
             <a:endParaRPr lang="zh-CN" altLang="en-US"/>
           </a:p>
@@ -281,7 +288,6 @@
               <a:rPr lang="zh-CN" altLang="en-US"/>
               <a:t>单击此处编辑母版文本样式</a:t>
             </a:r>
-            <a:endParaRPr lang="zh-CN" altLang="en-US"/>
           </a:p>
           <a:p>
             <a:pPr lvl="1"/>
@@ -289,7 +295,6 @@
               <a:rPr lang="zh-CN" altLang="en-US"/>
               <a:t>二级</a:t>
             </a:r>
-            <a:endParaRPr lang="zh-CN" altLang="en-US"/>
           </a:p>
           <a:p>
             <a:pPr lvl="2"/>
@@ -297,7 +302,6 @@
               <a:rPr lang="zh-CN" altLang="en-US"/>
               <a:t>三级</a:t>
             </a:r>
-            <a:endParaRPr lang="zh-CN" altLang="en-US"/>
           </a:p>
           <a:p>
             <a:pPr lvl="3"/>
@@ -305,7 +309,6 @@
               <a:rPr lang="zh-CN" altLang="en-US"/>
               <a:t>四级</a:t>
             </a:r>
-            <a:endParaRPr lang="zh-CN" altLang="en-US"/>
           </a:p>
           <a:p>
             <a:pPr lvl="4"/>
@@ -313,7 +316,6 @@
               <a:rPr lang="zh-CN" altLang="en-US"/>
               <a:t>五级</a:t>
             </a:r>
-            <a:endParaRPr lang="zh-CN" altLang="en-US"/>
           </a:p>
         </p:txBody>
       </p:sp>
@@ -377,6 +379,7 @@
           <a:p>
             <a:fld id="{7B705520-EB74-4E10-9207-DDFEA7EA0F0E}" type="slidenum">
               <a:rPr lang="zh-CN" altLang="en-US" smtClean="0"/>
+              <a:t>‹#›</a:t>
             </a:fld>
             <a:endParaRPr lang="zh-CN" altLang="en-US"/>
           </a:p>
@@ -586,6 +589,7 @@
                   <a:prstClr val="black"/>
                 </a:solidFill>
               </a:rPr>
+              <a:t>3</a:t>
             </a:fld>
             <a:endParaRPr lang="en-US" altLang="zh-CN">
               <a:solidFill>
@@ -709,6 +713,7 @@
                   <a:prstClr val="black"/>
                 </a:solidFill>
               </a:rPr>
+              <a:t>4</a:t>
             </a:fld>
             <a:endParaRPr lang="en-US" altLang="zh-CN">
               <a:solidFill>
@@ -832,6 +837,7 @@
                   <a:prstClr val="black"/>
                 </a:solidFill>
               </a:rPr>
+              <a:t>6</a:t>
             </a:fld>
             <a:endParaRPr lang="en-US" altLang="zh-CN">
               <a:solidFill>
@@ -955,6 +961,7 @@
                   <a:prstClr val="black"/>
                 </a:solidFill>
               </a:rPr>
+              <a:t>7</a:t>
             </a:fld>
             <a:endParaRPr lang="en-US" altLang="zh-CN">
               <a:solidFill>
@@ -1078,6 +1085,7 @@
                   <a:prstClr val="black"/>
                 </a:solidFill>
               </a:rPr>
+              <a:t>9</a:t>
             </a:fld>
             <a:endParaRPr lang="en-US" altLang="zh-CN">
               <a:solidFill>
@@ -1201,6 +1209,7 @@
                   <a:prstClr val="black"/>
                 </a:solidFill>
               </a:rPr>
+              <a:t>11</a:t>
             </a:fld>
             <a:endParaRPr lang="en-US" altLang="zh-CN">
               <a:solidFill>
@@ -1324,6 +1333,7 @@
                   <a:prstClr val="black"/>
                 </a:solidFill>
               </a:rPr>
+              <a:t>17</a:t>
             </a:fld>
             <a:endParaRPr lang="en-US" altLang="zh-CN">
               <a:solidFill>
@@ -1334,6 +1344,135 @@
         </p:txBody>
       </p:sp>
     </p:spTree>
+  </p:cSld>
+  <p:clrMapOvr>
+    <a:masterClrMapping/>
+  </p:clrMapOvr>
+</p:notes>
+</file>
+
+<file path=ppt/notesSlides/notesSlide8.xml><?xml version="1.0" encoding="utf-8"?>
+<p:notes xmlns:a="http://schemas.openxmlformats.org/drawingml/2006/main" xmlns:r="http://schemas.openxmlformats.org/officeDocument/2006/relationships" xmlns:p="http://schemas.openxmlformats.org/presentationml/2006/main">
+  <p:cSld>
+    <p:spTree>
+      <p:nvGrpSpPr>
+        <p:cNvPr id="1" name=""/>
+        <p:cNvGrpSpPr/>
+        <p:nvPr/>
+      </p:nvGrpSpPr>
+      <p:grpSpPr>
+        <a:xfrm>
+          <a:off x="0" y="0"/>
+          <a:ext cx="0" cy="0"/>
+          <a:chOff x="0" y="0"/>
+          <a:chExt cx="0" cy="0"/>
+        </a:xfrm>
+      </p:grpSpPr>
+      <p:sp>
+        <p:nvSpPr>
+          <p:cNvPr id="247810" name="Slide Image Placeholder 1"/>
+          <p:cNvSpPr>
+            <a:spLocks noGrp="1" noRot="1" noChangeAspect="1" noTextEdit="1"/>
+          </p:cNvSpPr>
+          <p:nvPr>
+            <p:ph type="sldImg"/>
+          </p:nvPr>
+        </p:nvSpPr>
+        <p:spPr bwMode="auto">
+          <a:xfrm>
+            <a:off x="381000" y="685800"/>
+            <a:ext cx="6096000" cy="3429000"/>
+          </a:xfrm>
+          <a:noFill/>
+          <a:ln>
+            <a:solidFill>
+              <a:srgbClr val="000000"/>
+            </a:solidFill>
+            <a:miter lim="800000"/>
+          </a:ln>
+        </p:spPr>
+      </p:sp>
+      <p:sp>
+        <p:nvSpPr>
+          <p:cNvPr id="3" name="Notes Placeholder 2"/>
+          <p:cNvSpPr>
+            <a:spLocks noGrp="1"/>
+          </p:cNvSpPr>
+          <p:nvPr>
+            <p:ph type="body" idx="1"/>
+          </p:nvPr>
+        </p:nvSpPr>
+        <p:spPr/>
+        <p:txBody>
+          <a:bodyPr wrap="square" numCol="1" anchor="t" anchorCtr="0" compatLnSpc="1"/>
+          <a:lstStyle/>
+          <a:p>
+            <a:pPr marL="542925" indent="-542925" eaLnBrk="1" hangingPunct="1">
+              <a:spcBef>
+                <a:spcPct val="0"/>
+              </a:spcBef>
+            </a:pPr>
+            <a:endParaRPr lang="en-US" altLang="zh-CN" dirty="0"/>
+          </a:p>
+        </p:txBody>
+      </p:sp>
+      <p:sp>
+        <p:nvSpPr>
+          <p:cNvPr id="247812" name="Slide Number Placeholder 3"/>
+          <p:cNvSpPr>
+            <a:spLocks noGrp="1"/>
+          </p:cNvSpPr>
+          <p:nvPr>
+            <p:ph type="sldNum" sz="quarter" idx="5"/>
+          </p:nvPr>
+        </p:nvSpPr>
+        <p:spPr bwMode="auto">
+          <a:extLst>
+            <a:ext uri="{909E8E84-426E-40DD-AFC4-6F175D3DCCD1}">
+              <a14:hiddenFill xmlns:a14="http://schemas.microsoft.com/office/drawing/2010/main">
+                <a:solidFill>
+                  <a:srgbClr val="FFFFFF"/>
+                </a:solidFill>
+              </a14:hiddenFill>
+            </a:ext>
+            <a:ext uri="{91240B29-F687-4F45-9708-019B960494DF}">
+              <a14:hiddenLine xmlns:a14="http://schemas.microsoft.com/office/drawing/2010/main" w="9525">
+                <a:solidFill>
+                  <a:srgbClr val="000000"/>
+                </a:solidFill>
+                <a:miter lim="800000"/>
+                <a:headEnd/>
+                <a:tailEnd/>
+              </a14:hiddenLine>
+            </a:ext>
+          </a:extLst>
+        </p:spPr>
+        <p:txBody>
+          <a:bodyPr/>
+          <a:lstStyle/>
+          <a:p>
+            <a:fld id="{CD5C04F1-088D-43BB-BF6A-7E5350A2ABBF}" type="slidenum">
+              <a:rPr lang="en-US" altLang="zh-CN">
+                <a:solidFill>
+                  <a:prstClr val="black"/>
+                </a:solidFill>
+              </a:rPr>
+              <a:t>18</a:t>
+            </a:fld>
+            <a:endParaRPr lang="en-US" altLang="zh-CN">
+              <a:solidFill>
+                <a:prstClr val="black"/>
+              </a:solidFill>
+            </a:endParaRPr>
+          </a:p>
+        </p:txBody>
+      </p:sp>
+    </p:spTree>
+    <p:extLst>
+      <p:ext uri="{BB962C8B-B14F-4D97-AF65-F5344CB8AC3E}">
+        <p14:creationId xmlns:p14="http://schemas.microsoft.com/office/powerpoint/2010/main" val="3005153859"/>
+      </p:ext>
+    </p:extLst>
   </p:cSld>
   <p:clrMapOvr>
     <a:masterClrMapping/>
@@ -1386,7 +1525,6 @@
               <a:rPr lang="zh-CN" altLang="en-US"/>
               <a:t>单击此处编辑母版标题样式</a:t>
             </a:r>
-            <a:endParaRPr lang="zh-CN" altLang="en-US"/>
           </a:p>
         </p:txBody>
       </p:sp>
@@ -1451,7 +1589,6 @@
               <a:rPr lang="zh-CN" altLang="en-US" dirty="0"/>
               <a:t>单击此处编辑母版副标题样式</a:t>
             </a:r>
-            <a:endParaRPr lang="zh-CN" altLang="en-US" dirty="0"/>
           </a:p>
         </p:txBody>
       </p:sp>
@@ -1472,6 +1609,7 @@
           <a:p>
             <a:fld id="{FC19A4FA-3D9A-4114-B0D5-759CBD56F1AB}" type="datetimeFigureOut">
               <a:rPr lang="zh-CN" altLang="en-US" smtClean="0"/>
+              <a:t>2021/11/20</a:t>
             </a:fld>
             <a:endParaRPr lang="zh-CN" altLang="en-US"/>
           </a:p>
@@ -1513,6 +1651,7 @@
           <a:p>
             <a:fld id="{506F4176-339E-4C4B-80E4-BBE9C4467EFE}" type="slidenum">
               <a:rPr lang="zh-CN" altLang="en-US" smtClean="0"/>
+              <a:t>‹#›</a:t>
             </a:fld>
             <a:endParaRPr lang="zh-CN" altLang="en-US"/>
           </a:p>
@@ -1593,7 +1732,6 @@
               <a:rPr lang="zh-CN" altLang="en-US"/>
               <a:t>单击此处编辑母版标题样式</a:t>
             </a:r>
-            <a:endParaRPr lang="zh-CN" altLang="en-US"/>
           </a:p>
         </p:txBody>
       </p:sp>
@@ -1617,7 +1755,6 @@
               <a:rPr lang="zh-CN" altLang="en-US"/>
               <a:t>单击此处编辑母版文本样式</a:t>
             </a:r>
-            <a:endParaRPr lang="zh-CN" altLang="en-US"/>
           </a:p>
           <a:p>
             <a:pPr lvl="1"/>
@@ -1625,7 +1762,6 @@
               <a:rPr lang="zh-CN" altLang="en-US"/>
               <a:t>第二级</a:t>
             </a:r>
-            <a:endParaRPr lang="zh-CN" altLang="en-US"/>
           </a:p>
           <a:p>
             <a:pPr lvl="2"/>
@@ -1633,7 +1769,6 @@
               <a:rPr lang="zh-CN" altLang="en-US"/>
               <a:t>第三级</a:t>
             </a:r>
-            <a:endParaRPr lang="zh-CN" altLang="en-US"/>
           </a:p>
           <a:p>
             <a:pPr lvl="3"/>
@@ -1641,7 +1776,6 @@
               <a:rPr lang="zh-CN" altLang="en-US"/>
               <a:t>第四级</a:t>
             </a:r>
-            <a:endParaRPr lang="zh-CN" altLang="en-US"/>
           </a:p>
           <a:p>
             <a:pPr lvl="4"/>
@@ -1649,7 +1783,6 @@
               <a:rPr lang="zh-CN" altLang="en-US"/>
               <a:t>第五级</a:t>
             </a:r>
-            <a:endParaRPr lang="zh-CN" altLang="en-US"/>
           </a:p>
         </p:txBody>
       </p:sp>
@@ -1670,6 +1803,7 @@
           <a:p>
             <a:fld id="{FC19A4FA-3D9A-4114-B0D5-759CBD56F1AB}" type="datetimeFigureOut">
               <a:rPr lang="zh-CN" altLang="en-US" smtClean="0"/>
+              <a:t>2021/11/20</a:t>
             </a:fld>
             <a:endParaRPr lang="zh-CN" altLang="en-US"/>
           </a:p>
@@ -1711,6 +1845,7 @@
           <a:p>
             <a:fld id="{506F4176-339E-4C4B-80E4-BBE9C4467EFE}" type="slidenum">
               <a:rPr lang="zh-CN" altLang="en-US" smtClean="0"/>
+              <a:t>‹#›</a:t>
             </a:fld>
             <a:endParaRPr lang="zh-CN" altLang="en-US"/>
           </a:p>
@@ -1765,7 +1900,6 @@
               <a:rPr lang="zh-CN" altLang="en-US"/>
               <a:t>单击此处编辑母版标题样式</a:t>
             </a:r>
-            <a:endParaRPr lang="zh-CN" altLang="en-US"/>
           </a:p>
         </p:txBody>
       </p:sp>
@@ -1794,7 +1928,6 @@
               <a:rPr lang="zh-CN" altLang="en-US"/>
               <a:t>单击此处编辑母版文本样式</a:t>
             </a:r>
-            <a:endParaRPr lang="zh-CN" altLang="en-US"/>
           </a:p>
           <a:p>
             <a:pPr lvl="1"/>
@@ -1802,7 +1935,6 @@
               <a:rPr lang="zh-CN" altLang="en-US"/>
               <a:t>第二级</a:t>
             </a:r>
-            <a:endParaRPr lang="zh-CN" altLang="en-US"/>
           </a:p>
           <a:p>
             <a:pPr lvl="2"/>
@@ -1810,7 +1942,6 @@
               <a:rPr lang="zh-CN" altLang="en-US"/>
               <a:t>第三级</a:t>
             </a:r>
-            <a:endParaRPr lang="zh-CN" altLang="en-US"/>
           </a:p>
           <a:p>
             <a:pPr lvl="3"/>
@@ -1818,7 +1949,6 @@
               <a:rPr lang="zh-CN" altLang="en-US"/>
               <a:t>第四级</a:t>
             </a:r>
-            <a:endParaRPr lang="zh-CN" altLang="en-US"/>
           </a:p>
           <a:p>
             <a:pPr lvl="4"/>
@@ -1826,7 +1956,6 @@
               <a:rPr lang="zh-CN" altLang="en-US"/>
               <a:t>第五级</a:t>
             </a:r>
-            <a:endParaRPr lang="zh-CN" altLang="en-US"/>
           </a:p>
         </p:txBody>
       </p:sp>
@@ -1847,6 +1976,7 @@
           <a:p>
             <a:fld id="{FC19A4FA-3D9A-4114-B0D5-759CBD56F1AB}" type="datetimeFigureOut">
               <a:rPr lang="zh-CN" altLang="en-US" smtClean="0"/>
+              <a:t>2021/11/20</a:t>
             </a:fld>
             <a:endParaRPr lang="zh-CN" altLang="en-US"/>
           </a:p>
@@ -1888,6 +2018,7 @@
           <a:p>
             <a:fld id="{506F4176-339E-4C4B-80E4-BBE9C4467EFE}" type="slidenum">
               <a:rPr lang="zh-CN" altLang="en-US" smtClean="0"/>
+              <a:t>‹#›</a:t>
             </a:fld>
             <a:endParaRPr lang="zh-CN" altLang="en-US"/>
           </a:p>
@@ -1942,7 +2073,6 @@
               <a:rPr lang="zh-CN" altLang="en-US" dirty="0"/>
               <a:t>单击此处编辑母版标题样式</a:t>
             </a:r>
-            <a:endParaRPr lang="zh-CN" altLang="en-US" dirty="0"/>
           </a:p>
         </p:txBody>
       </p:sp>
@@ -1982,7 +2112,6 @@
               <a:rPr lang="zh-CN" altLang="en-US" dirty="0"/>
               <a:t>单击此处编辑母版文本样式</a:t>
             </a:r>
-            <a:endParaRPr lang="zh-CN" altLang="en-US" dirty="0"/>
           </a:p>
           <a:p>
             <a:pPr lvl="1"/>
@@ -1990,7 +2119,6 @@
               <a:rPr lang="zh-CN" altLang="en-US" dirty="0"/>
               <a:t>第二级</a:t>
             </a:r>
-            <a:endParaRPr lang="zh-CN" altLang="en-US" dirty="0"/>
           </a:p>
           <a:p>
             <a:pPr lvl="2"/>
@@ -1998,7 +2126,6 @@
               <a:rPr lang="zh-CN" altLang="en-US" dirty="0"/>
               <a:t>第三级</a:t>
             </a:r>
-            <a:endParaRPr lang="zh-CN" altLang="en-US" dirty="0"/>
           </a:p>
           <a:p>
             <a:pPr lvl="3"/>
@@ -2006,7 +2133,6 @@
               <a:rPr lang="zh-CN" altLang="en-US" dirty="0"/>
               <a:t>第四级</a:t>
             </a:r>
-            <a:endParaRPr lang="zh-CN" altLang="en-US" dirty="0"/>
           </a:p>
           <a:p>
             <a:pPr lvl="4"/>
@@ -2014,7 +2140,6 @@
               <a:rPr lang="zh-CN" altLang="en-US" dirty="0"/>
               <a:t>第五级</a:t>
             </a:r>
-            <a:endParaRPr lang="zh-CN" altLang="en-US" dirty="0"/>
           </a:p>
         </p:txBody>
       </p:sp>
@@ -2035,6 +2160,7 @@
           <a:p>
             <a:fld id="{FC19A4FA-3D9A-4114-B0D5-759CBD56F1AB}" type="datetimeFigureOut">
               <a:rPr lang="zh-CN" altLang="en-US" smtClean="0"/>
+              <a:t>2021/11/20</a:t>
             </a:fld>
             <a:endParaRPr lang="zh-CN" altLang="en-US"/>
           </a:p>
@@ -2076,6 +2202,7 @@
           <a:p>
             <a:fld id="{506F4176-339E-4C4B-80E4-BBE9C4467EFE}" type="slidenum">
               <a:rPr lang="zh-CN" altLang="en-US" smtClean="0"/>
+              <a:t>‹#›</a:t>
             </a:fld>
             <a:endParaRPr lang="zh-CN" altLang="en-US"/>
           </a:p>
@@ -2158,7 +2285,6 @@
               <a:rPr lang="zh-CN" altLang="en-US"/>
               <a:t>单击此处编辑母版标题样式</a:t>
             </a:r>
-            <a:endParaRPr lang="zh-CN" altLang="en-US"/>
           </a:p>
         </p:txBody>
       </p:sp>
@@ -2187,7 +2313,6 @@
               <a:rPr lang="zh-CN" altLang="en-US"/>
               <a:t>单击此处编辑母版文本样式</a:t>
             </a:r>
-            <a:endParaRPr lang="zh-CN" altLang="en-US"/>
           </a:p>
           <a:p>
             <a:pPr lvl="1"/>
@@ -2195,7 +2320,6 @@
               <a:rPr lang="zh-CN" altLang="en-US"/>
               <a:t>第二级</a:t>
             </a:r>
-            <a:endParaRPr lang="zh-CN" altLang="en-US"/>
           </a:p>
           <a:p>
             <a:pPr lvl="2"/>
@@ -2203,7 +2327,6 @@
               <a:rPr lang="zh-CN" altLang="en-US"/>
               <a:t>第三级</a:t>
             </a:r>
-            <a:endParaRPr lang="zh-CN" altLang="en-US"/>
           </a:p>
           <a:p>
             <a:pPr lvl="3"/>
@@ -2211,7 +2334,6 @@
               <a:rPr lang="zh-CN" altLang="en-US"/>
               <a:t>第四级</a:t>
             </a:r>
-            <a:endParaRPr lang="zh-CN" altLang="en-US"/>
           </a:p>
           <a:p>
             <a:pPr lvl="4"/>
@@ -2219,7 +2341,6 @@
               <a:rPr lang="zh-CN" altLang="en-US"/>
               <a:t>第五级</a:t>
             </a:r>
-            <a:endParaRPr lang="zh-CN" altLang="en-US"/>
           </a:p>
         </p:txBody>
       </p:sp>
@@ -2248,7 +2369,6 @@
               <a:rPr lang="zh-CN" altLang="en-US"/>
               <a:t>单击此处编辑母版文本样式</a:t>
             </a:r>
-            <a:endParaRPr lang="zh-CN" altLang="en-US"/>
           </a:p>
           <a:p>
             <a:pPr lvl="1"/>
@@ -2256,7 +2376,6 @@
               <a:rPr lang="zh-CN" altLang="en-US"/>
               <a:t>第二级</a:t>
             </a:r>
-            <a:endParaRPr lang="zh-CN" altLang="en-US"/>
           </a:p>
           <a:p>
             <a:pPr lvl="2"/>
@@ -2264,7 +2383,6 @@
               <a:rPr lang="zh-CN" altLang="en-US"/>
               <a:t>第三级</a:t>
             </a:r>
-            <a:endParaRPr lang="zh-CN" altLang="en-US"/>
           </a:p>
           <a:p>
             <a:pPr lvl="3"/>
@@ -2272,7 +2390,6 @@
               <a:rPr lang="zh-CN" altLang="en-US"/>
               <a:t>第四级</a:t>
             </a:r>
-            <a:endParaRPr lang="zh-CN" altLang="en-US"/>
           </a:p>
           <a:p>
             <a:pPr lvl="4"/>
@@ -2280,7 +2397,6 @@
               <a:rPr lang="zh-CN" altLang="en-US"/>
               <a:t>第五级</a:t>
             </a:r>
-            <a:endParaRPr lang="zh-CN" altLang="en-US"/>
           </a:p>
         </p:txBody>
       </p:sp>
@@ -2301,6 +2417,7 @@
           <a:p>
             <a:fld id="{FC19A4FA-3D9A-4114-B0D5-759CBD56F1AB}" type="datetimeFigureOut">
               <a:rPr lang="zh-CN" altLang="en-US" smtClean="0"/>
+              <a:t>2021/11/20</a:t>
             </a:fld>
             <a:endParaRPr lang="zh-CN" altLang="en-US"/>
           </a:p>
@@ -2342,6 +2459,7 @@
           <a:p>
             <a:fld id="{506F4176-339E-4C4B-80E4-BBE9C4467EFE}" type="slidenum">
               <a:rPr lang="zh-CN" altLang="en-US" smtClean="0"/>
+              <a:t>‹#›</a:t>
             </a:fld>
             <a:endParaRPr lang="zh-CN" altLang="en-US"/>
           </a:p>
@@ -2424,7 +2542,6 @@
               <a:rPr lang="zh-CN" altLang="en-US"/>
               <a:t>单击此处编辑母版标题样式</a:t>
             </a:r>
-            <a:endParaRPr lang="zh-CN" altLang="en-US"/>
           </a:p>
         </p:txBody>
       </p:sp>
@@ -2490,7 +2607,6 @@
               <a:rPr lang="zh-CN" altLang="en-US"/>
               <a:t>单击此处编辑母版文本样式</a:t>
             </a:r>
-            <a:endParaRPr lang="zh-CN" altLang="en-US"/>
           </a:p>
         </p:txBody>
       </p:sp>
@@ -2519,7 +2635,6 @@
               <a:rPr lang="zh-CN" altLang="en-US"/>
               <a:t>单击此处编辑母版文本样式</a:t>
             </a:r>
-            <a:endParaRPr lang="zh-CN" altLang="en-US"/>
           </a:p>
           <a:p>
             <a:pPr lvl="1"/>
@@ -2527,7 +2642,6 @@
               <a:rPr lang="zh-CN" altLang="en-US"/>
               <a:t>第二级</a:t>
             </a:r>
-            <a:endParaRPr lang="zh-CN" altLang="en-US"/>
           </a:p>
           <a:p>
             <a:pPr lvl="2"/>
@@ -2535,7 +2649,6 @@
               <a:rPr lang="zh-CN" altLang="en-US"/>
               <a:t>第三级</a:t>
             </a:r>
-            <a:endParaRPr lang="zh-CN" altLang="en-US"/>
           </a:p>
           <a:p>
             <a:pPr lvl="3"/>
@@ -2543,7 +2656,6 @@
               <a:rPr lang="zh-CN" altLang="en-US"/>
               <a:t>第四级</a:t>
             </a:r>
-            <a:endParaRPr lang="zh-CN" altLang="en-US"/>
           </a:p>
           <a:p>
             <a:pPr lvl="4"/>
@@ -2551,7 +2663,6 @@
               <a:rPr lang="zh-CN" altLang="en-US"/>
               <a:t>第五级</a:t>
             </a:r>
-            <a:endParaRPr lang="zh-CN" altLang="en-US"/>
           </a:p>
         </p:txBody>
       </p:sp>
@@ -2617,7 +2728,6 @@
               <a:rPr lang="zh-CN" altLang="en-US"/>
               <a:t>单击此处编辑母版文本样式</a:t>
             </a:r>
-            <a:endParaRPr lang="zh-CN" altLang="en-US"/>
           </a:p>
         </p:txBody>
       </p:sp>
@@ -2646,7 +2756,6 @@
               <a:rPr lang="zh-CN" altLang="en-US"/>
               <a:t>单击此处编辑母版文本样式</a:t>
             </a:r>
-            <a:endParaRPr lang="zh-CN" altLang="en-US"/>
           </a:p>
           <a:p>
             <a:pPr lvl="1"/>
@@ -2654,7 +2763,6 @@
               <a:rPr lang="zh-CN" altLang="en-US"/>
               <a:t>第二级</a:t>
             </a:r>
-            <a:endParaRPr lang="zh-CN" altLang="en-US"/>
           </a:p>
           <a:p>
             <a:pPr lvl="2"/>
@@ -2662,7 +2770,6 @@
               <a:rPr lang="zh-CN" altLang="en-US"/>
               <a:t>第三级</a:t>
             </a:r>
-            <a:endParaRPr lang="zh-CN" altLang="en-US"/>
           </a:p>
           <a:p>
             <a:pPr lvl="3"/>
@@ -2670,7 +2777,6 @@
               <a:rPr lang="zh-CN" altLang="en-US"/>
               <a:t>第四级</a:t>
             </a:r>
-            <a:endParaRPr lang="zh-CN" altLang="en-US"/>
           </a:p>
           <a:p>
             <a:pPr lvl="4"/>
@@ -2678,7 +2784,6 @@
               <a:rPr lang="zh-CN" altLang="en-US"/>
               <a:t>第五级</a:t>
             </a:r>
-            <a:endParaRPr lang="zh-CN" altLang="en-US"/>
           </a:p>
         </p:txBody>
       </p:sp>
@@ -2699,6 +2804,7 @@
           <a:p>
             <a:fld id="{FC19A4FA-3D9A-4114-B0D5-759CBD56F1AB}" type="datetimeFigureOut">
               <a:rPr lang="zh-CN" altLang="en-US" smtClean="0"/>
+              <a:t>2021/11/20</a:t>
             </a:fld>
             <a:endParaRPr lang="zh-CN" altLang="en-US"/>
           </a:p>
@@ -2740,6 +2846,7 @@
           <a:p>
             <a:fld id="{506F4176-339E-4C4B-80E4-BBE9C4467EFE}" type="slidenum">
               <a:rPr lang="zh-CN" altLang="en-US" smtClean="0"/>
+              <a:t>‹#›</a:t>
             </a:fld>
             <a:endParaRPr lang="zh-CN" altLang="en-US"/>
           </a:p>
@@ -2826,7 +2933,6 @@
               <a:rPr lang="zh-CN" altLang="en-US"/>
               <a:t>单击此处编辑母版标题样式</a:t>
             </a:r>
-            <a:endParaRPr lang="zh-CN" altLang="en-US"/>
           </a:p>
         </p:txBody>
       </p:sp>
@@ -2946,7 +3052,6 @@
               <a:rPr lang="zh-CN" altLang="en-US"/>
               <a:t>单击此处编辑母版文本样式</a:t>
             </a:r>
-            <a:endParaRPr lang="zh-CN" altLang="en-US"/>
           </a:p>
         </p:txBody>
       </p:sp>
@@ -2967,6 +3072,7 @@
           <a:p>
             <a:fld id="{FC19A4FA-3D9A-4114-B0D5-759CBD56F1AB}" type="datetimeFigureOut">
               <a:rPr lang="zh-CN" altLang="en-US" smtClean="0"/>
+              <a:t>2021/11/20</a:t>
             </a:fld>
             <a:endParaRPr lang="zh-CN" altLang="en-US"/>
           </a:p>
@@ -3008,6 +3114,7 @@
           <a:p>
             <a:fld id="{506F4176-339E-4C4B-80E4-BBE9C4467EFE}" type="slidenum">
               <a:rPr lang="zh-CN" altLang="en-US" smtClean="0"/>
+              <a:t>‹#›</a:t>
             </a:fld>
             <a:endParaRPr lang="zh-CN" altLang="en-US"/>
           </a:p>
@@ -3085,7 +3192,6 @@
               <a:rPr lang="zh-CN" altLang="en-US"/>
               <a:t>单击此处编辑母版标题样式</a:t>
             </a:r>
-            <a:endParaRPr lang="zh-CN" altLang="en-US"/>
           </a:p>
         </p:txBody>
       </p:sp>
@@ -3106,6 +3212,7 @@
           <a:p>
             <a:fld id="{FC19A4FA-3D9A-4114-B0D5-759CBD56F1AB}" type="datetimeFigureOut">
               <a:rPr lang="zh-CN" altLang="en-US" smtClean="0"/>
+              <a:t>2021/11/20</a:t>
             </a:fld>
             <a:endParaRPr lang="zh-CN" altLang="en-US"/>
           </a:p>
@@ -3147,6 +3254,7 @@
           <a:p>
             <a:fld id="{506F4176-339E-4C4B-80E4-BBE9C4467EFE}" type="slidenum">
               <a:rPr lang="zh-CN" altLang="en-US" smtClean="0"/>
+              <a:t>‹#›</a:t>
             </a:fld>
             <a:endParaRPr lang="zh-CN" altLang="en-US"/>
           </a:p>
@@ -3194,6 +3302,7 @@
           <a:p>
             <a:fld id="{FC19A4FA-3D9A-4114-B0D5-759CBD56F1AB}" type="datetimeFigureOut">
               <a:rPr lang="zh-CN" altLang="en-US" smtClean="0"/>
+              <a:t>2021/11/20</a:t>
             </a:fld>
             <a:endParaRPr lang="zh-CN" altLang="en-US"/>
           </a:p>
@@ -3235,6 +3344,7 @@
           <a:p>
             <a:fld id="{506F4176-339E-4C4B-80E4-BBE9C4467EFE}" type="slidenum">
               <a:rPr lang="zh-CN" altLang="en-US" smtClean="0"/>
+              <a:t>‹#›</a:t>
             </a:fld>
             <a:endParaRPr lang="zh-CN" altLang="en-US"/>
           </a:p>
@@ -3293,7 +3403,6 @@
               <a:rPr lang="zh-CN" altLang="en-US"/>
               <a:t>单击此处编辑母版标题样式</a:t>
             </a:r>
-            <a:endParaRPr lang="zh-CN" altLang="en-US"/>
           </a:p>
         </p:txBody>
       </p:sp>
@@ -3350,7 +3459,6 @@
               <a:rPr lang="zh-CN" altLang="en-US"/>
               <a:t>单击此处编辑母版文本样式</a:t>
             </a:r>
-            <a:endParaRPr lang="zh-CN" altLang="en-US"/>
           </a:p>
           <a:p>
             <a:pPr lvl="1"/>
@@ -3358,7 +3466,6 @@
               <a:rPr lang="zh-CN" altLang="en-US"/>
               <a:t>第二级</a:t>
             </a:r>
-            <a:endParaRPr lang="zh-CN" altLang="en-US"/>
           </a:p>
           <a:p>
             <a:pPr lvl="2"/>
@@ -3366,7 +3473,6 @@
               <a:rPr lang="zh-CN" altLang="en-US"/>
               <a:t>第三级</a:t>
             </a:r>
-            <a:endParaRPr lang="zh-CN" altLang="en-US"/>
           </a:p>
           <a:p>
             <a:pPr lvl="3"/>
@@ -3374,7 +3480,6 @@
               <a:rPr lang="zh-CN" altLang="en-US"/>
               <a:t>第四级</a:t>
             </a:r>
-            <a:endParaRPr lang="zh-CN" altLang="en-US"/>
           </a:p>
           <a:p>
             <a:pPr lvl="4"/>
@@ -3382,7 +3487,6 @@
               <a:rPr lang="zh-CN" altLang="en-US"/>
               <a:t>第五级</a:t>
             </a:r>
-            <a:endParaRPr lang="zh-CN" altLang="en-US"/>
           </a:p>
         </p:txBody>
       </p:sp>
@@ -3448,7 +3552,6 @@
               <a:rPr lang="zh-CN" altLang="en-US"/>
               <a:t>单击此处编辑母版文本样式</a:t>
             </a:r>
-            <a:endParaRPr lang="zh-CN" altLang="en-US"/>
           </a:p>
         </p:txBody>
       </p:sp>
@@ -3469,6 +3572,7 @@
           <a:p>
             <a:fld id="{FC19A4FA-3D9A-4114-B0D5-759CBD56F1AB}" type="datetimeFigureOut">
               <a:rPr lang="zh-CN" altLang="en-US" smtClean="0"/>
+              <a:t>2021/11/20</a:t>
             </a:fld>
             <a:endParaRPr lang="zh-CN" altLang="en-US"/>
           </a:p>
@@ -3510,6 +3614,7 @@
           <a:p>
             <a:fld id="{506F4176-339E-4C4B-80E4-BBE9C4467EFE}" type="slidenum">
               <a:rPr lang="zh-CN" altLang="en-US" smtClean="0"/>
+              <a:t>‹#›</a:t>
             </a:fld>
             <a:endParaRPr lang="zh-CN" altLang="en-US"/>
           </a:p>
@@ -3568,7 +3673,6 @@
               <a:rPr lang="zh-CN" altLang="en-US"/>
               <a:t>单击此处编辑母版标题样式</a:t>
             </a:r>
-            <a:endParaRPr lang="zh-CN" altLang="en-US"/>
           </a:p>
         </p:txBody>
       </p:sp>
@@ -3695,7 +3799,6 @@
               <a:rPr lang="zh-CN" altLang="en-US"/>
               <a:t>单击此处编辑母版文本样式</a:t>
             </a:r>
-            <a:endParaRPr lang="zh-CN" altLang="en-US"/>
           </a:p>
         </p:txBody>
       </p:sp>
@@ -3716,6 +3819,7 @@
           <a:p>
             <a:fld id="{FC19A4FA-3D9A-4114-B0D5-759CBD56F1AB}" type="datetimeFigureOut">
               <a:rPr lang="zh-CN" altLang="en-US" smtClean="0"/>
+              <a:t>2021/11/20</a:t>
             </a:fld>
             <a:endParaRPr lang="zh-CN" altLang="en-US"/>
           </a:p>
@@ -3757,6 +3861,7 @@
           <a:p>
             <a:fld id="{506F4176-339E-4C4B-80E4-BBE9C4467EFE}" type="slidenum">
               <a:rPr lang="zh-CN" altLang="en-US" smtClean="0"/>
+              <a:t>‹#›</a:t>
             </a:fld>
             <a:endParaRPr lang="zh-CN" altLang="en-US"/>
           </a:p>
@@ -3821,7 +3926,6 @@
               <a:rPr lang="zh-CN" altLang="en-US" dirty="0"/>
               <a:t>单击此处编辑母版标题样式</a:t>
             </a:r>
-            <a:endParaRPr lang="zh-CN" altLang="en-US" dirty="0"/>
           </a:p>
         </p:txBody>
       </p:sp>
@@ -3855,7 +3959,6 @@
               <a:rPr lang="zh-CN" altLang="en-US" dirty="0"/>
               <a:t>单击此处编辑母版文本样式</a:t>
             </a:r>
-            <a:endParaRPr lang="zh-CN" altLang="en-US" dirty="0"/>
           </a:p>
           <a:p>
             <a:pPr lvl="1"/>
@@ -3863,7 +3966,6 @@
               <a:rPr lang="zh-CN" altLang="en-US" dirty="0"/>
               <a:t>第二级</a:t>
             </a:r>
-            <a:endParaRPr lang="zh-CN" altLang="en-US" dirty="0"/>
           </a:p>
           <a:p>
             <a:pPr lvl="2"/>
@@ -3871,7 +3973,6 @@
               <a:rPr lang="zh-CN" altLang="en-US" dirty="0"/>
               <a:t>第三级</a:t>
             </a:r>
-            <a:endParaRPr lang="zh-CN" altLang="en-US" dirty="0"/>
           </a:p>
           <a:p>
             <a:pPr lvl="3"/>
@@ -3879,7 +3980,6 @@
               <a:rPr lang="zh-CN" altLang="en-US" dirty="0"/>
               <a:t>第四级</a:t>
             </a:r>
-            <a:endParaRPr lang="zh-CN" altLang="en-US" dirty="0"/>
           </a:p>
           <a:p>
             <a:pPr lvl="4"/>
@@ -3887,7 +3987,6 @@
               <a:rPr lang="zh-CN" altLang="en-US" dirty="0"/>
               <a:t>第五级</a:t>
             </a:r>
-            <a:endParaRPr lang="zh-CN" altLang="en-US" dirty="0"/>
           </a:p>
         </p:txBody>
       </p:sp>
@@ -3926,6 +4025,7 @@
           <a:p>
             <a:fld id="{FC19A4FA-3D9A-4114-B0D5-759CBD56F1AB}" type="datetimeFigureOut">
               <a:rPr lang="zh-CN" altLang="en-US" smtClean="0"/>
+              <a:t>2021/11/20</a:t>
             </a:fld>
             <a:endParaRPr lang="zh-CN" altLang="en-US"/>
           </a:p>
@@ -4003,6 +4103,7 @@
           <a:p>
             <a:fld id="{506F4176-339E-4C4B-80E4-BBE9C4467EFE}" type="slidenum">
               <a:rPr lang="zh-CN" altLang="en-US" smtClean="0"/>
+              <a:t>‹#›</a:t>
             </a:fld>
             <a:endParaRPr lang="zh-CN" altLang="en-US"/>
           </a:p>
@@ -4017,7 +4118,7 @@
           <p:nvPr userDrawn="1"/>
         </p:nvPicPr>
         <p:blipFill>
-          <a:blip r:embed="rId12" cstate="print">
+          <a:blip r:embed="rId13" cstate="print">
             <a:extLst>
               <a:ext uri="{28A0092B-C50C-407E-A947-70E740481C1C}">
                 <a14:useLocalDpi xmlns:a14="http://schemas.microsoft.com/office/drawing/2010/main" val="0"/>
@@ -4521,7 +4622,7 @@
             <p:nvPr/>
           </p:nvPicPr>
           <p:blipFill>
-            <a:blip r:embed="rId1">
+            <a:blip r:embed="rId2">
               <a:extLst>
                 <a:ext uri="{28A0092B-C50C-407E-A947-70E740481C1C}">
                   <a14:useLocalDpi xmlns:a14="http://schemas.microsoft.com/office/drawing/2010/main" val="0"/>
@@ -4585,7 +4686,7 @@
             <p:nvPr/>
           </p:nvPicPr>
           <p:blipFill>
-            <a:blip r:embed="rId2">
+            <a:blip r:embed="rId3">
               <a:extLst>
                 <a:ext uri="{28A0092B-C50C-407E-A947-70E740481C1C}">
                   <a14:useLocalDpi xmlns:a14="http://schemas.microsoft.com/office/drawing/2010/main" val="0"/>
@@ -4650,7 +4751,7 @@
           <p:nvPr/>
         </p:nvPicPr>
         <p:blipFill>
-          <a:blip r:embed="rId3">
+          <a:blip r:embed="rId4">
             <a:extLst>
               <a:ext uri="{28A0092B-C50C-407E-A947-70E740481C1C}">
                 <a14:useLocalDpi xmlns:a14="http://schemas.microsoft.com/office/drawing/2010/main" val="0"/>
@@ -4709,7 +4810,7 @@
           <p:nvPr/>
         </p:nvPicPr>
         <p:blipFill>
-          <a:blip r:embed="rId4">
+          <a:blip r:embed="rId5">
             <a:extLst>
               <a:ext uri="{28A0092B-C50C-407E-A947-70E740481C1C}">
                 <a14:useLocalDpi xmlns:a14="http://schemas.microsoft.com/office/drawing/2010/main" val="0"/>
@@ -5887,7 +5988,7 @@
           <p:nvPr/>
         </p:nvPicPr>
         <p:blipFill>
-          <a:blip r:embed="rId1">
+          <a:blip r:embed="rId3">
             <a:extLst>
               <a:ext uri="{28A0092B-C50C-407E-A947-70E740481C1C}">
                 <a14:useLocalDpi xmlns:a14="http://schemas.microsoft.com/office/drawing/2010/main" val="0"/>
@@ -5951,7 +6052,7 @@
           <p:nvPr/>
         </p:nvPicPr>
         <p:blipFill>
-          <a:blip r:embed="rId2">
+          <a:blip r:embed="rId4">
             <a:extLst>
               <a:ext uri="{28A0092B-C50C-407E-A947-70E740481C1C}">
                 <a14:useLocalDpi xmlns:a14="http://schemas.microsoft.com/office/drawing/2010/main" val="0"/>
@@ -6032,7 +6133,6 @@
               <a:rPr lang="en-US" altLang="zh-CN" sz="4000" dirty="0"/>
               <a:t> Return object</a:t>
             </a:r>
-            <a:endParaRPr lang="en-US" altLang="zh-CN" sz="4000" dirty="0"/>
           </a:p>
         </p:txBody>
       </p:sp>
@@ -6101,7 +6201,6 @@
               <a:rPr lang="en-US" altLang="zh-CN" sz="2200" dirty="0"/>
               <a:t>Returning an object invokes the copy constructor, whereas returning a reference doesn’t.</a:t>
             </a:r>
-            <a:endParaRPr lang="en-US" altLang="zh-CN" sz="2200" dirty="0"/>
           </a:p>
           <a:p>
             <a:pPr marL="0" lvl="1"/>
@@ -6109,7 +6208,6 @@
               <a:rPr lang="en-US" altLang="zh-CN" sz="2200" dirty="0"/>
               <a:t>The reference should be to an object that exists when the calling function is executing.</a:t>
             </a:r>
-            <a:endParaRPr lang="en-US" altLang="zh-CN" sz="2200" dirty="0"/>
           </a:p>
         </p:txBody>
       </p:sp>
@@ -6669,7 +6767,7 @@
           <p:nvPr/>
         </p:nvPicPr>
         <p:blipFill>
-          <a:blip r:embed="rId1"/>
+          <a:blip r:embed="rId2"/>
           <a:stretch>
             <a:fillRect/>
           </a:stretch>
@@ -6693,7 +6791,7 @@
           <p:nvPr/>
         </p:nvPicPr>
         <p:blipFill>
-          <a:blip r:embed="rId2"/>
+          <a:blip r:embed="rId3"/>
           <a:stretch>
             <a:fillRect/>
           </a:stretch>
@@ -6747,7 +6845,6 @@
               <a:rPr lang="en-US" altLang="zh-CN" sz="2000" b="1" dirty="0"/>
               <a:t>assignment operator </a:t>
             </a:r>
-            <a:endParaRPr lang="en-US" altLang="zh-CN" sz="2000" b="1" dirty="0"/>
           </a:p>
           <a:p>
             <a:pPr marL="0" lvl="1"/>
@@ -6763,7 +6860,6 @@
               <a:rPr lang="en-US" altLang="zh-CN" sz="2000" dirty="0"/>
               <a:t>. The first is done for reasons of efficiency, and</a:t>
             </a:r>
-            <a:endParaRPr lang="en-US" altLang="zh-CN" sz="2000" dirty="0"/>
           </a:p>
           <a:p>
             <a:pPr marL="0" lvl="1"/>
@@ -6823,7 +6919,7 @@
           <p:nvPr/>
         </p:nvPicPr>
         <p:blipFill>
-          <a:blip r:embed="rId3">
+          <a:blip r:embed="rId4">
             <a:extLst>
               <a:ext uri="{28A0092B-C50C-407E-A947-70E740481C1C}">
                 <a14:useLocalDpi xmlns:a14="http://schemas.microsoft.com/office/drawing/2010/main" val="0"/>
@@ -7004,14 +7100,12 @@
                 <a:rPr lang="en-US" altLang="zh-CN" sz="1635" dirty="0"/>
                 <a:t>Returning a reference allows the function to avoid calling the String copy</a:t>
               </a:r>
-              <a:endParaRPr lang="en-US" altLang="zh-CN" sz="1635" dirty="0"/>
             </a:p>
             <a:p>
               <a:r>
                 <a:rPr lang="en-US" altLang="zh-CN" sz="1635" dirty="0"/>
                 <a:t>constructor to create a new String object. In this case, the return type is </a:t>
               </a:r>
-              <a:endParaRPr lang="en-US" altLang="zh-CN" sz="1635" dirty="0"/>
             </a:p>
             <a:p>
               <a:r>
@@ -7026,7 +7120,6 @@
                 <a:rPr lang="en-US" altLang="zh-CN" sz="1635" dirty="0"/>
                 <a:t> because the operator=() method return a reference to s2, which</a:t>
               </a:r>
-              <a:endParaRPr lang="en-US" altLang="zh-CN" sz="1635" dirty="0"/>
             </a:p>
             <a:p>
               <a:r>
@@ -7047,7 +7140,7 @@
           <p:nvPr/>
         </p:nvPicPr>
         <p:blipFill>
-          <a:blip r:embed="rId4">
+          <a:blip r:embed="rId5">
             <a:extLst>
               <a:ext uri="{28A0092B-C50C-407E-A947-70E740481C1C}">
                 <a14:useLocalDpi xmlns:a14="http://schemas.microsoft.com/office/drawing/2010/main" val="0"/>
@@ -7236,7 +7329,6 @@
                 <a:rPr lang="en-US" altLang="zh-CN" sz="1635" dirty="0"/>
                 <a:t> &amp;</a:t>
               </a:r>
-              <a:endParaRPr lang="en-US" altLang="zh-CN" sz="1635" dirty="0"/>
             </a:p>
             <a:p>
               <a:r>
@@ -7259,7 +7351,6 @@
                 <a:rPr lang="en-US" altLang="zh-CN" sz="1635" dirty="0"/>
                 <a:t> class </a:t>
               </a:r>
-              <a:endParaRPr lang="en-US" altLang="zh-CN" sz="1635" dirty="0"/>
             </a:p>
             <a:p>
               <a:r>
@@ -8005,7 +8096,7 @@
           <p:nvPr/>
         </p:nvPicPr>
         <p:blipFill>
-          <a:blip r:embed="rId1"/>
+          <a:blip r:embed="rId2"/>
           <a:stretch>
             <a:fillRect/>
           </a:stretch>
@@ -8029,7 +8120,7 @@
           <p:nvPr/>
         </p:nvPicPr>
         <p:blipFill>
-          <a:blip r:embed="rId2"/>
+          <a:blip r:embed="rId3"/>
           <a:stretch>
             <a:fillRect/>
           </a:stretch>
@@ -8075,11 +8166,6 @@
               </a:rPr>
               <a:t>If the object being returned is local to the called function, then it should not be returned by reference</a:t>
             </a:r>
-            <a:endParaRPr lang="en-US" altLang="zh-CN" sz="2000" dirty="0">
-              <a:solidFill>
-                <a:prstClr val="black"/>
-              </a:solidFill>
-            </a:endParaRPr>
           </a:p>
           <a:p>
             <a:pPr marL="0" lvl="1"/>
@@ -8091,11 +8177,6 @@
               </a:rPr>
               <a:t>because the local object has its destructor called when the function terminates. Thus, when control</a:t>
             </a:r>
-            <a:endParaRPr lang="en-US" altLang="zh-CN" sz="2000" dirty="0">
-              <a:solidFill>
-                <a:prstClr val="black"/>
-              </a:solidFill>
-            </a:endParaRPr>
           </a:p>
           <a:p>
             <a:pPr marL="0" lvl="1"/>
@@ -8185,11 +8266,6 @@
               </a:rPr>
               <a:t>There is the added expense of calling the copy constructor to create the returned object, but that is</a:t>
             </a:r>
-            <a:endParaRPr lang="en-US" altLang="zh-CN" sz="2200" dirty="0">
-              <a:solidFill>
-                <a:prstClr val="black"/>
-              </a:solidFill>
-            </a:endParaRPr>
           </a:p>
           <a:p>
             <a:pPr marL="0" lvl="1"/>
@@ -8367,11 +8443,6 @@
                     </a:rPr>
                     <a:t>The statement invokes the Rational constructor to create a temporary Rational </a:t>
                   </a:r>
-                  <a:endParaRPr lang="en-US" altLang="zh-CN" sz="2000" dirty="0">
-                    <a:solidFill>
-                      <a:prstClr val="black"/>
-                    </a:solidFill>
-                  </a:endParaRPr>
                 </a:p>
                 <a:p>
                   <a:r>
@@ -8382,11 +8453,6 @@
                     </a:rPr>
                     <a:t>object  and returns the object to the caller. The function shouldn’t return a </a:t>
                   </a:r>
-                  <a:endParaRPr lang="en-US" altLang="zh-CN" sz="2000" dirty="0">
-                    <a:solidFill>
-                      <a:prstClr val="black"/>
-                    </a:solidFill>
-                  </a:endParaRPr>
                 </a:p>
                 <a:p>
                   <a:r>
@@ -8397,11 +8463,6 @@
                     </a:rPr>
                     <a:t>reference to a temporary object,  it should return an actual Rational object, </a:t>
                   </a:r>
-                  <a:endParaRPr lang="en-US" altLang="zh-CN" sz="2000" dirty="0">
-                    <a:solidFill>
-                      <a:prstClr val="black"/>
-                    </a:solidFill>
-                  </a:endParaRPr>
                 </a:p>
                 <a:p>
                   <a:r>
@@ -8909,7 +8970,7 @@
           <p:nvPr/>
         </p:nvPicPr>
         <p:blipFill>
-          <a:blip r:embed="rId1"/>
+          <a:blip r:embed="rId2"/>
           <a:stretch>
             <a:fillRect/>
           </a:stretch>
@@ -9065,11 +9126,6 @@
               </a:rPr>
               <a:t> object. Then statement 1 is still allowed but the statement 2 </a:t>
             </a:r>
-            <a:endParaRPr lang="en-US" altLang="zh-CN" sz="2200" dirty="0">
-              <a:solidFill>
-                <a:prstClr val="black"/>
-              </a:solidFill>
-            </a:endParaRPr>
           </a:p>
           <a:p>
             <a:pPr marL="0" lvl="1"/>
@@ -9165,11 +9221,6 @@
                 </a:rPr>
                 <a:t> stands for the temporary object which the copy constructor constructs.</a:t>
               </a:r>
-              <a:endParaRPr lang="en-US" altLang="zh-CN" dirty="0">
-                <a:solidFill>
-                  <a:prstClr val="black"/>
-                </a:solidFill>
-              </a:endParaRPr>
             </a:p>
             <a:p>
               <a:r>
@@ -9196,11 +9247,6 @@
                 </a:rPr>
                 <a:t> and</a:t>
               </a:r>
-              <a:endParaRPr lang="en-US" altLang="zh-CN" dirty="0">
-                <a:solidFill>
-                  <a:prstClr val="black"/>
-                </a:solidFill>
-              </a:endParaRPr>
             </a:p>
             <a:p>
               <a:r>
@@ -9338,7 +9384,7 @@
           <p:nvPr/>
         </p:nvPicPr>
         <p:blipFill>
-          <a:blip r:embed="rId2"/>
+          <a:blip r:embed="rId3"/>
           <a:stretch>
             <a:fillRect/>
           </a:stretch>
@@ -9738,7 +9784,7 @@
           <p:nvPr/>
         </p:nvPicPr>
         <p:blipFill>
-          <a:blip r:embed="rId1"/>
+          <a:blip r:embed="rId2"/>
           <a:stretch>
             <a:fillRect/>
           </a:stretch>
@@ -10304,7 +10350,7 @@
           <p:nvPr/>
         </p:nvPicPr>
         <p:blipFill>
-          <a:blip r:embed="rId1"/>
+          <a:blip r:embed="rId2"/>
           <a:stretch>
             <a:fillRect/>
           </a:stretch>
@@ -10394,11 +10440,6 @@
               </a:rPr>
               <a:t>Remember, release the memory in the caller. But in some cases, you can not release any memory</a:t>
             </a:r>
-            <a:endParaRPr lang="en-US" altLang="zh-CN" sz="2200" dirty="0">
-              <a:solidFill>
-                <a:prstClr val="black"/>
-              </a:solidFill>
-            </a:endParaRPr>
           </a:p>
           <a:p>
             <a:pPr marL="0" lvl="1"/>
@@ -10874,7 +10915,7 @@
           <p:nvPr/>
         </p:nvPicPr>
         <p:blipFill>
-          <a:blip r:embed="rId2"/>
+          <a:blip r:embed="rId3"/>
           <a:stretch>
             <a:fillRect/>
           </a:stretch>
@@ -11343,7 +11384,6 @@
               <a:rPr lang="en-US" altLang="zh-CN" sz="3800" dirty="0"/>
               <a:t>Using Pointers to Objects</a:t>
             </a:r>
-            <a:endParaRPr lang="en-US" altLang="zh-CN" sz="3800" dirty="0"/>
           </a:p>
         </p:txBody>
       </p:sp>
@@ -11386,7 +11426,7 @@
           <p:nvPr/>
         </p:nvPicPr>
         <p:blipFill>
-          <a:blip r:embed="rId1"/>
+          <a:blip r:embed="rId3"/>
           <a:stretch>
             <a:fillRect/>
           </a:stretch>
@@ -12199,7 +12239,305 @@
         <p:cNvGrpSpPr/>
         <p:nvPr/>
       </p:nvGrpSpPr>
-      <p:grpSpPr/>
+      <p:grpSpPr>
+        <a:xfrm>
+          <a:off x="0" y="0"/>
+          <a:ext cx="0" cy="0"/>
+          <a:chOff x="0" y="0"/>
+          <a:chExt cx="0" cy="0"/>
+        </a:xfrm>
+      </p:grpSpPr>
+      <p:sp>
+        <p:nvSpPr>
+          <p:cNvPr id="10" name="Title 1"/>
+          <p:cNvSpPr>
+            <a:spLocks noGrp="1"/>
+          </p:cNvSpPr>
+          <p:nvPr>
+            <p:ph type="title"/>
+          </p:nvPr>
+        </p:nvSpPr>
+        <p:spPr>
+          <a:xfrm>
+            <a:off x="1336804" y="299129"/>
+            <a:ext cx="6880948" cy="971258"/>
+          </a:xfrm>
+        </p:spPr>
+        <p:txBody>
+          <a:bodyPr>
+            <a:noAutofit/>
+          </a:bodyPr>
+          <a:lstStyle/>
+          <a:p>
+            <a:r>
+              <a:rPr lang="en-US" altLang="zh-CN" sz="3800" dirty="0"/>
+              <a:t>Smart pointers</a:t>
+            </a:r>
+          </a:p>
+        </p:txBody>
+      </p:sp>
+      <p:sp>
+        <p:nvSpPr>
+          <p:cNvPr id="2" name="TextBox 1"/>
+          <p:cNvSpPr txBox="1"/>
+          <p:nvPr/>
+        </p:nvSpPr>
+        <p:spPr>
+          <a:xfrm>
+            <a:off x="789327" y="1512612"/>
+            <a:ext cx="10217990" cy="2308324"/>
+          </a:xfrm>
+          <a:prstGeom prst="rect">
+            <a:avLst/>
+          </a:prstGeom>
+          <a:noFill/>
+        </p:spPr>
+        <p:txBody>
+          <a:bodyPr wrap="none" rtlCol="0">
+            <a:spAutoFit/>
+          </a:bodyPr>
+          <a:lstStyle/>
+          <a:p>
+            <a:r>
+              <a:rPr lang="en-US" altLang="zh-CN" sz="2400" dirty="0"/>
+              <a:t>To make using dynamic memory easier (and safer), the new library provides two </a:t>
+            </a:r>
+          </a:p>
+          <a:p>
+            <a:r>
+              <a:rPr lang="en-US" altLang="zh-CN" sz="2400" dirty="0"/>
+              <a:t>smart pointer types(</a:t>
+            </a:r>
+            <a:r>
+              <a:rPr lang="en-US" altLang="zh-CN" sz="2400" b="1" dirty="0" err="1"/>
+              <a:t>unique_ptr</a:t>
+            </a:r>
+            <a:r>
+              <a:rPr lang="en-US" altLang="zh-CN" sz="2400" b="1" dirty="0"/>
+              <a:t> </a:t>
+            </a:r>
+            <a:r>
+              <a:rPr lang="en-US" altLang="zh-CN" sz="2400" dirty="0"/>
+              <a:t>and </a:t>
+            </a:r>
+            <a:r>
+              <a:rPr lang="en-US" altLang="zh-CN" sz="2400" b="1" dirty="0" err="1"/>
+              <a:t>shared_ptr</a:t>
+            </a:r>
+            <a:r>
+              <a:rPr lang="en-US" altLang="zh-CN" sz="2400" dirty="0"/>
+              <a:t>) that manage dynamic objects. </a:t>
+            </a:r>
+          </a:p>
+          <a:p>
+            <a:r>
+              <a:rPr lang="en-US" altLang="zh-CN" sz="2400" dirty="0"/>
+              <a:t>A smart pointer acts like a regular pointer with the important exception that it </a:t>
+            </a:r>
+          </a:p>
+          <a:p>
+            <a:r>
+              <a:rPr lang="en-US" altLang="zh-CN" sz="2400" dirty="0"/>
+              <a:t>automatically deletes the object to which it points. A</a:t>
+            </a:r>
+            <a:r>
+              <a:rPr lang="en-US" altLang="zh-CN" sz="2400" b="0" i="0" dirty="0">
+                <a:solidFill>
+                  <a:srgbClr val="171717"/>
+                </a:solidFill>
+                <a:effectLst/>
+                <a:latin typeface="Segoe UI" panose="020B0502040204020203" pitchFamily="34" charset="0"/>
+              </a:rPr>
+              <a:t> smart pointer is a class </a:t>
+            </a:r>
+          </a:p>
+          <a:p>
+            <a:r>
+              <a:rPr lang="en-US" altLang="zh-CN" sz="2400" b="0" i="0" dirty="0">
+                <a:solidFill>
+                  <a:srgbClr val="171717"/>
+                </a:solidFill>
+                <a:effectLst/>
+                <a:latin typeface="Segoe UI" panose="020B0502040204020203" pitchFamily="34" charset="0"/>
+              </a:rPr>
+              <a:t>template </a:t>
+            </a:r>
+            <a:r>
+              <a:rPr kumimoji="0" lang="zh-CN" altLang="zh-CN" sz="2400" b="0" i="0" u="none" strike="noStrike" cap="none" normalizeH="0" baseline="0" dirty="0">
+                <a:ln>
+                  <a:noFill/>
+                </a:ln>
+                <a:solidFill>
+                  <a:srgbClr val="171717"/>
+                </a:solidFill>
+                <a:effectLst/>
+                <a:latin typeface="Segoe UI" panose="020B0502040204020203" pitchFamily="34" charset="0"/>
+                <a:cs typeface="Segoe UI" panose="020B0502040204020203" pitchFamily="34" charset="0"/>
+              </a:rPr>
+              <a:t>defined in the </a:t>
+            </a:r>
+            <a:r>
+              <a:rPr lang="en-US" altLang="zh-CN" sz="2400" b="1" dirty="0">
+                <a:solidFill>
+                  <a:srgbClr val="171717"/>
+                </a:solidFill>
+                <a:latin typeface="Segoe UI" panose="020B0502040204020203" pitchFamily="34" charset="0"/>
+                <a:cs typeface="Segoe UI" panose="020B0502040204020203" pitchFamily="34" charset="0"/>
+              </a:rPr>
+              <a:t>s</a:t>
+            </a:r>
+            <a:r>
+              <a:rPr kumimoji="0" lang="en-US" altLang="zh-CN" sz="2400" b="1" i="0" u="none" strike="noStrike" cap="none" normalizeH="0" baseline="0" dirty="0">
+                <a:ln>
+                  <a:noFill/>
+                </a:ln>
+                <a:solidFill>
+                  <a:srgbClr val="171717"/>
+                </a:solidFill>
+                <a:effectLst/>
+                <a:latin typeface="Segoe UI" panose="020B0502040204020203" pitchFamily="34" charset="0"/>
+                <a:cs typeface="Segoe UI" panose="020B0502040204020203" pitchFamily="34" charset="0"/>
+              </a:rPr>
+              <a:t>td</a:t>
+            </a:r>
+            <a:r>
+              <a:rPr kumimoji="0" lang="en-US" altLang="zh-CN" sz="2400" b="0" i="0" u="none" strike="noStrike" cap="none" normalizeH="0" baseline="0" dirty="0">
+                <a:ln>
+                  <a:noFill/>
+                </a:ln>
+                <a:solidFill>
+                  <a:srgbClr val="171717"/>
+                </a:solidFill>
+                <a:effectLst/>
+                <a:latin typeface="Segoe UI" panose="020B0502040204020203" pitchFamily="34" charset="0"/>
+                <a:cs typeface="Segoe UI" panose="020B0502040204020203" pitchFamily="34" charset="0"/>
+              </a:rPr>
+              <a:t> </a:t>
+            </a:r>
+            <a:r>
+              <a:rPr kumimoji="0" lang="zh-CN" altLang="zh-CN" sz="2400" b="0" i="0" u="none" strike="noStrike" cap="none" normalizeH="0" baseline="0" dirty="0">
+                <a:ln>
+                  <a:noFill/>
+                </a:ln>
+                <a:solidFill>
+                  <a:srgbClr val="171717"/>
+                </a:solidFill>
+                <a:effectLst/>
+                <a:latin typeface="Segoe UI" panose="020B0502040204020203" pitchFamily="34" charset="0"/>
+                <a:cs typeface="Segoe UI" panose="020B0502040204020203" pitchFamily="34" charset="0"/>
+              </a:rPr>
+              <a:t>namespace in the </a:t>
+            </a:r>
+            <a:r>
+              <a:rPr kumimoji="0" lang="zh-CN" altLang="zh-CN" sz="2400" b="1" i="0" u="none" strike="noStrike" cap="none" normalizeH="0" baseline="0" dirty="0">
+                <a:ln>
+                  <a:noFill/>
+                </a:ln>
+                <a:solidFill>
+                  <a:schemeClr val="tx1"/>
+                </a:solidFill>
+                <a:effectLst/>
+                <a:latin typeface="Segoe UI" panose="020B0502040204020203" pitchFamily="34" charset="0"/>
+                <a:cs typeface="Segoe UI" panose="020B0502040204020203" pitchFamily="34" charset="0"/>
+              </a:rPr>
+              <a:t>&lt;memory&gt;</a:t>
+            </a:r>
+            <a:r>
+              <a:rPr kumimoji="0" lang="zh-CN" altLang="zh-CN" sz="2400" b="1" i="0" u="none" strike="noStrike" cap="none" normalizeH="0" baseline="0" dirty="0">
+                <a:ln>
+                  <a:noFill/>
+                </a:ln>
+                <a:solidFill>
+                  <a:srgbClr val="171717"/>
+                </a:solidFill>
+                <a:effectLst/>
+                <a:latin typeface="Segoe UI" panose="020B0502040204020203" pitchFamily="34" charset="0"/>
+                <a:cs typeface="Segoe UI" panose="020B0502040204020203" pitchFamily="34" charset="0"/>
+              </a:rPr>
+              <a:t> </a:t>
+            </a:r>
+            <a:r>
+              <a:rPr kumimoji="0" lang="zh-CN" altLang="zh-CN" sz="2400" b="0" i="0" u="none" strike="noStrike" cap="none" normalizeH="0" baseline="0" dirty="0">
+                <a:ln>
+                  <a:noFill/>
+                </a:ln>
+                <a:solidFill>
+                  <a:srgbClr val="171717"/>
+                </a:solidFill>
+                <a:effectLst/>
+                <a:latin typeface="Segoe UI" panose="020B0502040204020203" pitchFamily="34" charset="0"/>
+                <a:cs typeface="Segoe UI" panose="020B0502040204020203" pitchFamily="34" charset="0"/>
+              </a:rPr>
+              <a:t>header file.</a:t>
+            </a:r>
+            <a:r>
+              <a:rPr kumimoji="0" lang="zh-CN" altLang="zh-CN" sz="1200" b="0" i="0" u="none" strike="noStrike" cap="none" normalizeH="0" baseline="0" dirty="0">
+                <a:ln>
+                  <a:noFill/>
+                </a:ln>
+                <a:solidFill>
+                  <a:schemeClr val="tx1"/>
+                </a:solidFill>
+                <a:effectLst/>
+              </a:rPr>
+              <a:t> </a:t>
+            </a:r>
+            <a:endParaRPr kumimoji="0" lang="zh-CN" altLang="zh-CN" sz="3600" b="0" i="0" u="none" strike="noStrike" cap="none" normalizeH="0" baseline="0" dirty="0">
+              <a:ln>
+                <a:noFill/>
+              </a:ln>
+              <a:solidFill>
+                <a:schemeClr val="tx1"/>
+              </a:solidFill>
+              <a:effectLst/>
+              <a:latin typeface="Arial" panose="020B0604020202020204" pitchFamily="34" charset="0"/>
+            </a:endParaRPr>
+          </a:p>
+          <a:p>
+            <a:r>
+              <a:rPr lang="en-US" altLang="zh-CN" sz="2400" b="0" i="0" dirty="0">
+                <a:solidFill>
+                  <a:srgbClr val="171717"/>
+                </a:solidFill>
+                <a:effectLst/>
+                <a:latin typeface="Segoe UI" panose="020B0502040204020203" pitchFamily="34" charset="0"/>
+              </a:rPr>
+              <a:t> </a:t>
+            </a:r>
+            <a:endParaRPr lang="zh-CN" altLang="en-US" sz="2400" dirty="0"/>
+          </a:p>
+        </p:txBody>
+      </p:sp>
+    </p:spTree>
+    <p:extLst>
+      <p:ext uri="{BB962C8B-B14F-4D97-AF65-F5344CB8AC3E}">
+        <p14:creationId xmlns:p14="http://schemas.microsoft.com/office/powerpoint/2010/main" val="1138636665"/>
+      </p:ext>
+    </p:extLst>
+  </p:cSld>
+  <p:clrMapOvr>
+    <a:masterClrMapping/>
+  </p:clrMapOvr>
+</p:sld>
+</file>
+
+<file path=ppt/slides/slide19.xml><?xml version="1.0" encoding="utf-8"?>
+<p:sld xmlns:a="http://schemas.openxmlformats.org/drawingml/2006/main" xmlns:r="http://schemas.openxmlformats.org/officeDocument/2006/relationships" xmlns:p="http://schemas.openxmlformats.org/presentationml/2006/main">
+  <p:cSld>
+    <p:spTree>
+      <p:nvGrpSpPr>
+        <p:cNvPr id="1" name=""/>
+        <p:cNvGrpSpPr/>
+        <p:nvPr/>
+      </p:nvGrpSpPr>
+      <p:grpSpPr>
+        <a:xfrm>
+          <a:off x="0" y="0"/>
+          <a:ext cx="0" cy="0"/>
+          <a:chOff x="0" y="0"/>
+          <a:chExt cx="0" cy="0"/>
+        </a:xfrm>
+      </p:grpSpPr>
       <p:sp>
         <p:nvSpPr>
           <p:cNvPr id="2" name="标题 1"/>
@@ -12213,12 +12551,12 @@
         <p:spPr/>
         <p:txBody>
           <a:bodyPr/>
+          <a:lstStyle/>
           <a:p>
             <a:r>
               <a:rPr lang="en-US" altLang="zh-CN"/>
               <a:t>Unique pointer</a:t>
             </a:r>
-            <a:endParaRPr lang="en-US" altLang="zh-CN"/>
           </a:p>
         </p:txBody>
       </p:sp>
@@ -12235,33 +12573,30 @@
         <p:spPr/>
         <p:txBody>
           <a:bodyPr/>
+          <a:lstStyle/>
           <a:p>
             <a:r>
               <a:rPr lang="en-US" altLang="zh-CN"/>
               <a:t>C++ provides unique pointers to help manage your dynamic memory.</a:t>
             </a:r>
-            <a:endParaRPr lang="en-US" altLang="zh-CN"/>
           </a:p>
           <a:p>
             <a:r>
               <a:rPr lang="en-US" altLang="zh-CN"/>
               <a:t>A unique pointer object take ownership of a pointer.</a:t>
             </a:r>
-            <a:endParaRPr lang="en-US" altLang="zh-CN"/>
           </a:p>
           <a:p>
             <a:r>
               <a:rPr lang="en-US" altLang="zh-CN"/>
               <a:t>When the unique pointer is deleted, the memory is freed too.</a:t>
             </a:r>
-            <a:endParaRPr lang="en-US" altLang="zh-CN"/>
           </a:p>
           <a:p>
             <a:r>
               <a:rPr lang="en-US" altLang="zh-CN"/>
               <a:t>You can initialize it with a raw pointer.</a:t>
             </a:r>
-            <a:endParaRPr lang="en-US" altLang="zh-CN"/>
           </a:p>
         </p:txBody>
       </p:sp>
@@ -12274,7 +12609,7 @@
           <p:nvPr/>
         </p:nvPicPr>
         <p:blipFill>
-          <a:blip r:embed="rId1"/>
+          <a:blip r:embed="rId2"/>
           <a:stretch>
             <a:fillRect/>
           </a:stretch>
@@ -12298,7 +12633,7 @@
           <p:nvPr/>
         </p:nvPicPr>
         <p:blipFill>
-          <a:blip r:embed="rId2"/>
+          <a:blip r:embed="rId3"/>
           <a:stretch>
             <a:fillRect/>
           </a:stretch>
@@ -12307,116 +12642,6 @@
           <a:xfrm>
             <a:off x="7639685" y="4057015"/>
             <a:ext cx="3829050" cy="894080"/>
-          </a:xfrm>
-          <a:prstGeom prst="rect">
-            <a:avLst/>
-          </a:prstGeom>
-        </p:spPr>
-      </p:pic>
-    </p:spTree>
-  </p:cSld>
-  <p:clrMapOvr>
-    <a:masterClrMapping/>
-  </p:clrMapOvr>
-</p:sld>
-</file>
-
-<file path=ppt/slides/slide19.xml><?xml version="1.0" encoding="utf-8"?>
-<p:sld xmlns:a="http://schemas.openxmlformats.org/drawingml/2006/main" xmlns:r="http://schemas.openxmlformats.org/officeDocument/2006/relationships" xmlns:p="http://schemas.openxmlformats.org/presentationml/2006/main">
-  <p:cSld>
-    <p:spTree>
-      <p:nvGrpSpPr>
-        <p:cNvPr id="1" name=""/>
-        <p:cNvGrpSpPr/>
-        <p:nvPr/>
-      </p:nvGrpSpPr>
-      <p:grpSpPr/>
-      <p:sp>
-        <p:nvSpPr>
-          <p:cNvPr id="2" name="标题 1"/>
-          <p:cNvSpPr>
-            <a:spLocks noGrp="1"/>
-          </p:cNvSpPr>
-          <p:nvPr>
-            <p:ph type="title"/>
-          </p:nvPr>
-        </p:nvSpPr>
-        <p:spPr/>
-        <p:txBody>
-          <a:bodyPr/>
-          <a:p>
-            <a:r>
-              <a:rPr lang="en-US" altLang="zh-CN"/>
-              <a:t>Unique pointer</a:t>
-            </a:r>
-            <a:endParaRPr lang="en-US" altLang="zh-CN"/>
-          </a:p>
-        </p:txBody>
-      </p:sp>
-      <p:sp>
-        <p:nvSpPr>
-          <p:cNvPr id="3" name="内容占位符 2"/>
-          <p:cNvSpPr>
-            <a:spLocks noGrp="1"/>
-          </p:cNvSpPr>
-          <p:nvPr>
-            <p:ph idx="1"/>
-          </p:nvPr>
-        </p:nvSpPr>
-        <p:spPr/>
-        <p:txBody>
-          <a:bodyPr/>
-          <a:p>
-            <a:r>
-              <a:rPr lang="en-US" altLang="zh-CN"/>
-              <a:t>There are several ways to use a unique pointer:</a:t>
-            </a:r>
-            <a:endParaRPr lang="en-US" altLang="zh-CN"/>
-          </a:p>
-        </p:txBody>
-      </p:sp>
-      <p:pic>
-        <p:nvPicPr>
-          <p:cNvPr id="5" name="图片 4"/>
-          <p:cNvPicPr>
-            <a:picLocks noChangeAspect="1"/>
-          </p:cNvPicPr>
-          <p:nvPr/>
-        </p:nvPicPr>
-        <p:blipFill>
-          <a:blip r:embed="rId1"/>
-          <a:stretch>
-            <a:fillRect/>
-          </a:stretch>
-        </p:blipFill>
-        <p:spPr>
-          <a:xfrm>
-            <a:off x="6917055" y="2327910"/>
-            <a:ext cx="2816860" cy="1614805"/>
-          </a:xfrm>
-          <a:prstGeom prst="rect">
-            <a:avLst/>
-          </a:prstGeom>
-        </p:spPr>
-      </p:pic>
-      <p:pic>
-        <p:nvPicPr>
-          <p:cNvPr id="6" name="图片 5"/>
-          <p:cNvPicPr>
-            <a:picLocks noChangeAspect="1"/>
-          </p:cNvPicPr>
-          <p:nvPr/>
-        </p:nvPicPr>
-        <p:blipFill>
-          <a:blip r:embed="rId2"/>
-          <a:stretch>
-            <a:fillRect/>
-          </a:stretch>
-        </p:blipFill>
-        <p:spPr>
-          <a:xfrm>
-            <a:off x="1267460" y="2327910"/>
-            <a:ext cx="4728845" cy="3019425"/>
           </a:xfrm>
           <a:prstGeom prst="rect">
             <a:avLst/>
@@ -12476,13 +12701,6 @@
               </a:rPr>
               <a:t>Dynamic memory in classes</a:t>
             </a:r>
-            <a:endParaRPr lang="en-US" altLang="zh-CN" sz="4000" b="1" i="0" dirty="0">
-              <a:solidFill>
-                <a:srgbClr val="24292F"/>
-              </a:solidFill>
-              <a:effectLst/>
-              <a:cs typeface="+mj-lt"/>
-            </a:endParaRPr>
           </a:p>
         </p:txBody>
       </p:sp>
@@ -12516,9 +12734,6 @@
               </a:rPr>
               <a:t>Constructor and destructor</a:t>
             </a:r>
-            <a:endParaRPr lang="en-US" altLang="zh-CN" dirty="0">
-              <a:sym typeface="+mn-ea"/>
-            </a:endParaRPr>
           </a:p>
           <a:p>
             <a:pPr marL="285750" indent="-285750">
@@ -12531,9 +12746,6 @@
               </a:rPr>
               <a:t>Copy constructor</a:t>
             </a:r>
-            <a:endParaRPr lang="en-US" altLang="zh-CN" dirty="0">
-              <a:sym typeface="+mn-ea"/>
-            </a:endParaRPr>
           </a:p>
           <a:p>
             <a:pPr marL="285750" indent="-285750">
@@ -12546,9 +12758,6 @@
               </a:rPr>
               <a:t>Assignment operator</a:t>
             </a:r>
-            <a:endParaRPr lang="en-US" altLang="zh-CN" dirty="0">
-              <a:sym typeface="+mn-ea"/>
-            </a:endParaRPr>
           </a:p>
           <a:p>
             <a:pPr marL="285750" indent="-285750">
@@ -12561,9 +12770,6 @@
               </a:rPr>
               <a:t>Return objects</a:t>
             </a:r>
-            <a:endParaRPr lang="en-US" altLang="zh-CN" dirty="0">
-              <a:sym typeface="+mn-ea"/>
-            </a:endParaRPr>
           </a:p>
           <a:p>
             <a:pPr marL="285750" indent="-285750">
@@ -12576,9 +12782,18 @@
               </a:rPr>
               <a:t>Pointers to objects</a:t>
             </a:r>
-            <a:endParaRPr lang="en-US" altLang="zh-CN" dirty="0">
-              <a:sym typeface="+mn-ea"/>
-            </a:endParaRPr>
+          </a:p>
+          <a:p>
+            <a:pPr marL="285750" indent="-285750">
+              <a:buFont typeface="Arial" panose="020B0604020202020204" pitchFamily="34" charset="0"/>
+              <a:buChar char="•"/>
+            </a:pPr>
+            <a:r>
+              <a:rPr lang="en-US" altLang="zh-CN" dirty="0">
+                <a:sym typeface="+mn-ea"/>
+              </a:rPr>
+              <a:t>Smart pointers</a:t>
+            </a:r>
           </a:p>
           <a:p>
             <a:pPr marL="0" indent="0">
@@ -12607,7 +12822,14 @@
         <p:cNvGrpSpPr/>
         <p:nvPr/>
       </p:nvGrpSpPr>
-      <p:grpSpPr/>
+      <p:grpSpPr>
+        <a:xfrm>
+          <a:off x="0" y="0"/>
+          <a:ext cx="0" cy="0"/>
+          <a:chOff x="0" y="0"/>
+          <a:chExt cx="0" cy="0"/>
+        </a:xfrm>
+      </p:grpSpPr>
       <p:sp>
         <p:nvSpPr>
           <p:cNvPr id="2" name="标题 1"/>
@@ -12621,12 +12843,12 @@
         <p:spPr/>
         <p:txBody>
           <a:bodyPr/>
+          <a:lstStyle/>
           <a:p>
             <a:r>
               <a:rPr lang="en-US" altLang="zh-CN"/>
               <a:t>Unique pointer</a:t>
             </a:r>
-            <a:endParaRPr lang="en-US" altLang="zh-CN"/>
           </a:p>
         </p:txBody>
       </p:sp>
@@ -12643,40 +12865,57 @@
         <p:spPr/>
         <p:txBody>
           <a:bodyPr/>
+          <a:lstStyle/>
           <a:p>
             <a:r>
               <a:rPr lang="en-US" altLang="zh-CN"/>
-              <a:t>Does smart pointers always solve our problems?</a:t>
-            </a:r>
-            <a:endParaRPr lang="en-US" altLang="zh-CN"/>
-          </a:p>
-          <a:p>
-            <a:r>
-              <a:rPr lang="en-US" altLang="zh-CN"/>
-              <a:t>Can we do this?</a:t>
-            </a:r>
-            <a:endParaRPr lang="en-US" altLang="zh-CN"/>
+              <a:t>There are several ways to use a unique pointer:</a:t>
+            </a:r>
           </a:p>
         </p:txBody>
       </p:sp>
       <p:pic>
         <p:nvPicPr>
-          <p:cNvPr id="4" name="图片 3"/>
+          <p:cNvPr id="5" name="图片 4"/>
           <p:cNvPicPr>
             <a:picLocks noChangeAspect="1"/>
           </p:cNvPicPr>
           <p:nvPr/>
         </p:nvPicPr>
         <p:blipFill>
-          <a:blip r:embed="rId1"/>
+          <a:blip r:embed="rId2"/>
           <a:stretch>
             <a:fillRect/>
           </a:stretch>
         </p:blipFill>
         <p:spPr>
           <a:xfrm>
-            <a:off x="3543300" y="2663825"/>
-            <a:ext cx="3123565" cy="2176780"/>
+            <a:off x="6917055" y="2327910"/>
+            <a:ext cx="2816860" cy="1614805"/>
+          </a:xfrm>
+          <a:prstGeom prst="rect">
+            <a:avLst/>
+          </a:prstGeom>
+        </p:spPr>
+      </p:pic>
+      <p:pic>
+        <p:nvPicPr>
+          <p:cNvPr id="6" name="图片 5"/>
+          <p:cNvPicPr>
+            <a:picLocks noChangeAspect="1"/>
+          </p:cNvPicPr>
+          <p:nvPr/>
+        </p:nvPicPr>
+        <p:blipFill>
+          <a:blip r:embed="rId3"/>
+          <a:stretch>
+            <a:fillRect/>
+          </a:stretch>
+        </p:blipFill>
+        <p:spPr>
+          <a:xfrm>
+            <a:off x="1267460" y="2327910"/>
+            <a:ext cx="4728845" cy="3019425"/>
           </a:xfrm>
           <a:prstGeom prst="rect">
             <a:avLst/>
@@ -12700,7 +12939,14 @@
         <p:cNvGrpSpPr/>
         <p:nvPr/>
       </p:nvGrpSpPr>
-      <p:grpSpPr/>
+      <p:grpSpPr>
+        <a:xfrm>
+          <a:off x="0" y="0"/>
+          <a:ext cx="0" cy="0"/>
+          <a:chOff x="0" y="0"/>
+          <a:chExt cx="0" cy="0"/>
+        </a:xfrm>
+      </p:grpSpPr>
       <p:sp>
         <p:nvSpPr>
           <p:cNvPr id="2" name="标题 1"/>
@@ -12714,12 +12960,12 @@
         <p:spPr/>
         <p:txBody>
           <a:bodyPr/>
+          <a:lstStyle/>
           <a:p>
             <a:r>
               <a:rPr lang="en-US" altLang="zh-CN"/>
               <a:t>Unique pointer</a:t>
             </a:r>
-            <a:endParaRPr lang="en-US" altLang="zh-CN"/>
           </a:p>
         </p:txBody>
       </p:sp>
@@ -12736,12 +12982,18 @@
         <p:spPr/>
         <p:txBody>
           <a:bodyPr/>
+          <a:lstStyle/>
           <a:p>
             <a:r>
               <a:rPr lang="en-US" altLang="zh-CN"/>
-              <a:t>Try the following code:</a:t>
-            </a:r>
-            <a:endParaRPr lang="en-US" altLang="zh-CN"/>
+              <a:t>Does smart pointers always solve our problems?</a:t>
+            </a:r>
+          </a:p>
+          <a:p>
+            <a:r>
+              <a:rPr lang="en-US" altLang="zh-CN"/>
+              <a:t>Can we do this?</a:t>
+            </a:r>
           </a:p>
         </p:txBody>
       </p:sp>
@@ -12754,15 +13006,15 @@
           <p:nvPr/>
         </p:nvPicPr>
         <p:blipFill>
-          <a:blip r:embed="rId1"/>
+          <a:blip r:embed="rId2"/>
           <a:stretch>
             <a:fillRect/>
           </a:stretch>
         </p:blipFill>
         <p:spPr>
           <a:xfrm>
-            <a:off x="2011680" y="2292985"/>
-            <a:ext cx="3311525" cy="2481580"/>
+            <a:off x="3543300" y="2663825"/>
+            <a:ext cx="3123565" cy="2176780"/>
           </a:xfrm>
           <a:prstGeom prst="rect">
             <a:avLst/>
@@ -12786,7 +13038,14 @@
         <p:cNvGrpSpPr/>
         <p:nvPr/>
       </p:nvGrpSpPr>
-      <p:grpSpPr/>
+      <p:grpSpPr>
+        <a:xfrm>
+          <a:off x="0" y="0"/>
+          <a:ext cx="0" cy="0"/>
+          <a:chOff x="0" y="0"/>
+          <a:chExt cx="0" cy="0"/>
+        </a:xfrm>
+      </p:grpSpPr>
       <p:sp>
         <p:nvSpPr>
           <p:cNvPr id="2" name="标题 1"/>
@@ -12800,12 +13059,12 @@
         <p:spPr/>
         <p:txBody>
           <a:bodyPr/>
+          <a:lstStyle/>
           <a:p>
             <a:r>
               <a:rPr lang="en-US" altLang="zh-CN"/>
-              <a:t>Shared pointer</a:t>
-            </a:r>
-            <a:endParaRPr lang="en-US" altLang="zh-CN"/>
+              <a:t>Unique pointer</a:t>
+            </a:r>
           </a:p>
         </p:txBody>
       </p:sp>
@@ -12822,26 +13081,12 @@
         <p:spPr/>
         <p:txBody>
           <a:bodyPr/>
+          <a:lstStyle/>
           <a:p>
             <a:r>
               <a:rPr lang="en-US" altLang="zh-CN"/>
-              <a:t>C++ provides shared pointer to help manage your dynamic memory.</a:t>
-            </a:r>
-            <a:endParaRPr lang="en-US" altLang="zh-CN"/>
-          </a:p>
-          <a:p>
-            <a:r>
-              <a:rPr lang="en-US" altLang="zh-CN"/>
-              <a:t>You can make several shared pointers points to one piece of memory.</a:t>
-            </a:r>
-            <a:endParaRPr lang="en-US" altLang="zh-CN"/>
-          </a:p>
-          <a:p>
-            <a:r>
-              <a:rPr lang="en-US" altLang="zh-CN"/>
-              <a:t>If the last one of them is released, the dynamic memory is released.</a:t>
-            </a:r>
-            <a:endParaRPr lang="en-US" altLang="zh-CN"/>
+              <a:t>Try the following code:</a:t>
+            </a:r>
           </a:p>
         </p:txBody>
       </p:sp>
@@ -12854,7 +13099,112 @@
           <p:nvPr/>
         </p:nvPicPr>
         <p:blipFill>
-          <a:blip r:embed="rId1"/>
+          <a:blip r:embed="rId2"/>
+          <a:stretch>
+            <a:fillRect/>
+          </a:stretch>
+        </p:blipFill>
+        <p:spPr>
+          <a:xfrm>
+            <a:off x="2011680" y="2292985"/>
+            <a:ext cx="3311525" cy="2481580"/>
+          </a:xfrm>
+          <a:prstGeom prst="rect">
+            <a:avLst/>
+          </a:prstGeom>
+        </p:spPr>
+      </p:pic>
+    </p:spTree>
+  </p:cSld>
+  <p:clrMapOvr>
+    <a:masterClrMapping/>
+  </p:clrMapOvr>
+</p:sld>
+</file>
+
+<file path=ppt/slides/slide23.xml><?xml version="1.0" encoding="utf-8"?>
+<p:sld xmlns:a="http://schemas.openxmlformats.org/drawingml/2006/main" xmlns:r="http://schemas.openxmlformats.org/officeDocument/2006/relationships" xmlns:p="http://schemas.openxmlformats.org/presentationml/2006/main">
+  <p:cSld>
+    <p:spTree>
+      <p:nvGrpSpPr>
+        <p:cNvPr id="1" name=""/>
+        <p:cNvGrpSpPr/>
+        <p:nvPr/>
+      </p:nvGrpSpPr>
+      <p:grpSpPr>
+        <a:xfrm>
+          <a:off x="0" y="0"/>
+          <a:ext cx="0" cy="0"/>
+          <a:chOff x="0" y="0"/>
+          <a:chExt cx="0" cy="0"/>
+        </a:xfrm>
+      </p:grpSpPr>
+      <p:sp>
+        <p:nvSpPr>
+          <p:cNvPr id="2" name="标题 1"/>
+          <p:cNvSpPr>
+            <a:spLocks noGrp="1"/>
+          </p:cNvSpPr>
+          <p:nvPr>
+            <p:ph type="title"/>
+          </p:nvPr>
+        </p:nvSpPr>
+        <p:spPr/>
+        <p:txBody>
+          <a:bodyPr/>
+          <a:lstStyle/>
+          <a:p>
+            <a:r>
+              <a:rPr lang="en-US" altLang="zh-CN"/>
+              <a:t>Shared pointer</a:t>
+            </a:r>
+          </a:p>
+        </p:txBody>
+      </p:sp>
+      <p:sp>
+        <p:nvSpPr>
+          <p:cNvPr id="3" name="内容占位符 2"/>
+          <p:cNvSpPr>
+            <a:spLocks noGrp="1"/>
+          </p:cNvSpPr>
+          <p:nvPr>
+            <p:ph idx="1"/>
+          </p:nvPr>
+        </p:nvSpPr>
+        <p:spPr/>
+        <p:txBody>
+          <a:bodyPr/>
+          <a:lstStyle/>
+          <a:p>
+            <a:r>
+              <a:rPr lang="en-US" altLang="zh-CN"/>
+              <a:t>C++ provides shared pointer to help manage your dynamic memory.</a:t>
+            </a:r>
+          </a:p>
+          <a:p>
+            <a:r>
+              <a:rPr lang="en-US" altLang="zh-CN"/>
+              <a:t>You can make several shared pointers points to one piece of memory.</a:t>
+            </a:r>
+          </a:p>
+          <a:p>
+            <a:r>
+              <a:rPr lang="en-US" altLang="zh-CN"/>
+              <a:t>If the last one of them is released, the dynamic memory is released.</a:t>
+            </a:r>
+          </a:p>
+        </p:txBody>
+      </p:sp>
+      <p:pic>
+        <p:nvPicPr>
+          <p:cNvPr id="4" name="图片 3"/>
+          <p:cNvPicPr>
+            <a:picLocks noChangeAspect="1"/>
+          </p:cNvPicPr>
+          <p:nvPr/>
+        </p:nvPicPr>
+        <p:blipFill>
+          <a:blip r:embed="rId2"/>
           <a:stretch>
             <a:fillRect/>
           </a:stretch>
@@ -12878,7 +13228,7 @@
           <p:nvPr/>
         </p:nvPicPr>
         <p:blipFill>
-          <a:blip r:embed="rId2"/>
+          <a:blip r:embed="rId3"/>
           <a:stretch>
             <a:fillRect/>
           </a:stretch>
@@ -12887,104 +13237,6 @@
           <a:xfrm>
             <a:off x="6203950" y="3451860"/>
             <a:ext cx="3608070" cy="1183005"/>
-          </a:xfrm>
-          <a:prstGeom prst="rect">
-            <a:avLst/>
-          </a:prstGeom>
-        </p:spPr>
-      </p:pic>
-    </p:spTree>
-  </p:cSld>
-  <p:clrMapOvr>
-    <a:masterClrMapping/>
-  </p:clrMapOvr>
-</p:sld>
-</file>
-
-<file path=ppt/slides/slide23.xml><?xml version="1.0" encoding="utf-8"?>
-<p:sld xmlns:a="http://schemas.openxmlformats.org/drawingml/2006/main" xmlns:r="http://schemas.openxmlformats.org/officeDocument/2006/relationships" xmlns:p="http://schemas.openxmlformats.org/presentationml/2006/main">
-  <p:cSld>
-    <p:spTree>
-      <p:nvGrpSpPr>
-        <p:cNvPr id="1" name=""/>
-        <p:cNvGrpSpPr/>
-        <p:nvPr/>
-      </p:nvGrpSpPr>
-      <p:grpSpPr/>
-      <p:sp>
-        <p:nvSpPr>
-          <p:cNvPr id="2" name="标题 1"/>
-          <p:cNvSpPr>
-            <a:spLocks noGrp="1"/>
-          </p:cNvSpPr>
-          <p:nvPr>
-            <p:ph type="title"/>
-          </p:nvPr>
-        </p:nvSpPr>
-        <p:spPr/>
-        <p:txBody>
-          <a:bodyPr/>
-          <a:p>
-            <a:r>
-              <a:rPr lang="en-US" altLang="zh-CN"/>
-              <a:t>Shared pointer</a:t>
-            </a:r>
-            <a:endParaRPr lang="en-US" altLang="zh-CN"/>
-          </a:p>
-        </p:txBody>
-      </p:sp>
-      <p:sp>
-        <p:nvSpPr>
-          <p:cNvPr id="3" name="内容占位符 2"/>
-          <p:cNvSpPr>
-            <a:spLocks noGrp="1"/>
-          </p:cNvSpPr>
-          <p:nvPr>
-            <p:ph idx="1"/>
-          </p:nvPr>
-        </p:nvSpPr>
-        <p:spPr>
-          <a:xfrm>
-            <a:off x="838199" y="1003780"/>
-            <a:ext cx="11053879" cy="4849968"/>
-          </a:xfrm>
-        </p:spPr>
-        <p:txBody>
-          <a:bodyPr/>
-          <a:p>
-            <a:r>
-              <a:rPr lang="en-US" altLang="zh-CN"/>
-              <a:t>Does shared pointer always releases memory?</a:t>
-            </a:r>
-            <a:endParaRPr lang="en-US" altLang="zh-CN"/>
-          </a:p>
-          <a:p>
-            <a:r>
-              <a:rPr lang="en-US" altLang="zh-CN"/>
-              <a:t>Can we do this?</a:t>
-            </a:r>
-            <a:endParaRPr lang="en-US" altLang="zh-CN"/>
-          </a:p>
-        </p:txBody>
-      </p:sp>
-      <p:pic>
-        <p:nvPicPr>
-          <p:cNvPr id="4" name="图片 3"/>
-          <p:cNvPicPr>
-            <a:picLocks noChangeAspect="1"/>
-          </p:cNvPicPr>
-          <p:nvPr/>
-        </p:nvPicPr>
-        <p:blipFill>
-          <a:blip r:embed="rId1"/>
-          <a:stretch>
-            <a:fillRect/>
-          </a:stretch>
-        </p:blipFill>
-        <p:spPr>
-          <a:xfrm>
-            <a:off x="3834765" y="1464310"/>
-            <a:ext cx="3462655" cy="5393690"/>
           </a:xfrm>
           <a:prstGeom prst="rect">
             <a:avLst/>
@@ -13033,9 +13285,112 @@
           <a:p>
             <a:r>
               <a:rPr lang="en-US" altLang="zh-CN"/>
+              <a:t>Shared pointer</a:t>
+            </a:r>
+          </a:p>
+        </p:txBody>
+      </p:sp>
+      <p:sp>
+        <p:nvSpPr>
+          <p:cNvPr id="3" name="内容占位符 2"/>
+          <p:cNvSpPr>
+            <a:spLocks noGrp="1"/>
+          </p:cNvSpPr>
+          <p:nvPr>
+            <p:ph idx="1"/>
+          </p:nvPr>
+        </p:nvSpPr>
+        <p:spPr>
+          <a:xfrm>
+            <a:off x="838199" y="1003780"/>
+            <a:ext cx="11053879" cy="4849968"/>
+          </a:xfrm>
+        </p:spPr>
+        <p:txBody>
+          <a:bodyPr/>
+          <a:lstStyle/>
+          <a:p>
+            <a:r>
+              <a:rPr lang="en-US" altLang="zh-CN"/>
+              <a:t>Does shared pointer always releases memory?</a:t>
+            </a:r>
+          </a:p>
+          <a:p>
+            <a:r>
+              <a:rPr lang="en-US" altLang="zh-CN"/>
+              <a:t>Can we do this?</a:t>
+            </a:r>
+          </a:p>
+        </p:txBody>
+      </p:sp>
+      <p:pic>
+        <p:nvPicPr>
+          <p:cNvPr id="4" name="图片 3"/>
+          <p:cNvPicPr>
+            <a:picLocks noChangeAspect="1"/>
+          </p:cNvPicPr>
+          <p:nvPr/>
+        </p:nvPicPr>
+        <p:blipFill>
+          <a:blip r:embed="rId2"/>
+          <a:stretch>
+            <a:fillRect/>
+          </a:stretch>
+        </p:blipFill>
+        <p:spPr>
+          <a:xfrm>
+            <a:off x="3834765" y="1464310"/>
+            <a:ext cx="3462655" cy="5393690"/>
+          </a:xfrm>
+          <a:prstGeom prst="rect">
+            <a:avLst/>
+          </a:prstGeom>
+        </p:spPr>
+      </p:pic>
+    </p:spTree>
+  </p:cSld>
+  <p:clrMapOvr>
+    <a:masterClrMapping/>
+  </p:clrMapOvr>
+</p:sld>
+</file>
+
+<file path=ppt/slides/slide25.xml><?xml version="1.0" encoding="utf-8"?>
+<p:sld xmlns:a="http://schemas.openxmlformats.org/drawingml/2006/main" xmlns:r="http://schemas.openxmlformats.org/officeDocument/2006/relationships" xmlns:p="http://schemas.openxmlformats.org/presentationml/2006/main">
+  <p:cSld>
+    <p:spTree>
+      <p:nvGrpSpPr>
+        <p:cNvPr id="1" name=""/>
+        <p:cNvGrpSpPr/>
+        <p:nvPr/>
+      </p:nvGrpSpPr>
+      <p:grpSpPr>
+        <a:xfrm>
+          <a:off x="0" y="0"/>
+          <a:ext cx="0" cy="0"/>
+          <a:chOff x="0" y="0"/>
+          <a:chExt cx="0" cy="0"/>
+        </a:xfrm>
+      </p:grpSpPr>
+      <p:sp>
+        <p:nvSpPr>
+          <p:cNvPr id="2" name="标题 1"/>
+          <p:cNvSpPr>
+            <a:spLocks noGrp="1"/>
+          </p:cNvSpPr>
+          <p:nvPr>
+            <p:ph type="title"/>
+          </p:nvPr>
+        </p:nvSpPr>
+        <p:spPr/>
+        <p:txBody>
+          <a:bodyPr/>
+          <a:lstStyle/>
+          <a:p>
+            <a:r>
+              <a:rPr lang="en-US" altLang="zh-CN"/>
               <a:t>Exercise:</a:t>
             </a:r>
-            <a:endParaRPr lang="en-US" altLang="zh-CN"/>
           </a:p>
         </p:txBody>
       </p:sp>
@@ -13068,10 +13423,6 @@
               </a:rPr>
               <a:t>Create a class for matrices which elements are in float. The class should support the follow operations and has no memory management problem. When a matrix is assigned to another by =, the two matrices will share the same data.</a:t>
             </a:r>
-            <a:endParaRPr lang="en-US" altLang="zh-CN" sz="1600" b="0" dirty="0">
-              <a:effectLst/>
-              <a:latin typeface="Consolas" panose="020B0609020204030204" pitchFamily="49" charset="0"/>
-            </a:endParaRPr>
           </a:p>
           <a:p>
             <a:r>
@@ -13081,10 +13432,6 @@
               </a:rPr>
               <a:t>class Matrix{...};</a:t>
             </a:r>
-            <a:endParaRPr lang="en-US" altLang="zh-CN" sz="1600" b="0" dirty="0">
-              <a:effectLst/>
-              <a:latin typeface="Consolas" panose="020B0609020204030204" pitchFamily="49" charset="0"/>
-            </a:endParaRPr>
           </a:p>
           <a:p>
             <a:r>
@@ -13094,10 +13441,6 @@
               </a:rPr>
               <a:t>Matrix a(3,4);</a:t>
             </a:r>
-            <a:endParaRPr lang="en-US" altLang="zh-CN" sz="1600" b="0" dirty="0">
-              <a:effectLst/>
-              <a:latin typeface="Consolas" panose="020B0609020204030204" pitchFamily="49" charset="0"/>
-            </a:endParaRPr>
           </a:p>
           <a:p>
             <a:r>
@@ -13107,10 +13450,6 @@
               </a:rPr>
               <a:t>Matrix b(3,4);</a:t>
             </a:r>
-            <a:endParaRPr lang="en-US" altLang="zh-CN" sz="1600" b="0" dirty="0">
-              <a:effectLst/>
-              <a:latin typeface="Consolas" panose="020B0609020204030204" pitchFamily="49" charset="0"/>
-            </a:endParaRPr>
           </a:p>
           <a:p>
             <a:r>
@@ -13120,10 +13459,6 @@
               </a:rPr>
               <a:t>Matrix c = a + b;</a:t>
             </a:r>
-            <a:endParaRPr lang="en-US" altLang="zh-CN" sz="1600" b="0" dirty="0">
-              <a:effectLst/>
-              <a:latin typeface="Consolas" panose="020B0609020204030204" pitchFamily="49" charset="0"/>
-            </a:endParaRPr>
           </a:p>
           <a:p>
             <a:r>
@@ -13133,10 +13468,6 @@
               </a:rPr>
               <a:t>Matrix d = a * 2.0f;</a:t>
             </a:r>
-            <a:endParaRPr lang="en-US" altLang="zh-CN" sz="1600" b="0" dirty="0">
-              <a:effectLst/>
-              <a:latin typeface="Consolas" panose="020B0609020204030204" pitchFamily="49" charset="0"/>
-            </a:endParaRPr>
           </a:p>
           <a:p>
             <a:pPr marL="0" indent="0">
@@ -13206,7 +13537,6 @@
               <a:rPr lang="en-US" altLang="zh-CN" sz="4720" dirty="0"/>
               <a:t>Constructor and Destructor</a:t>
             </a:r>
-            <a:endParaRPr lang="en-US" altLang="zh-CN" sz="4720" dirty="0"/>
           </a:p>
         </p:txBody>
       </p:sp>
@@ -13257,11 +13587,6 @@
               </a:rPr>
               <a:t>, you should think more carefully  about </a:t>
             </a:r>
-            <a:endParaRPr lang="en-US" altLang="zh-CN" sz="2400" dirty="0">
-              <a:solidFill>
-                <a:prstClr val="black"/>
-              </a:solidFill>
-            </a:endParaRPr>
           </a:p>
           <a:p>
             <a:pPr marL="0" lvl="1"/>
@@ -13392,11 +13717,6 @@
               </a:rPr>
               <a:t> to allocate enough memory to hold the data where the </a:t>
             </a:r>
-            <a:endParaRPr lang="en-US" altLang="zh-CN" sz="2400" dirty="0">
-              <a:solidFill>
-                <a:prstClr val="black"/>
-              </a:solidFill>
-            </a:endParaRPr>
           </a:p>
           <a:p>
             <a:pPr marL="0" lvl="1"/>
@@ -13408,11 +13728,6 @@
               </a:rPr>
               <a:t>pointer points to. Second, initialize the storage space with proper data.</a:t>
             </a:r>
-            <a:endParaRPr lang="en-US" altLang="zh-CN" sz="2400" dirty="0">
-              <a:solidFill>
-                <a:prstClr val="black"/>
-              </a:solidFill>
-            </a:endParaRPr>
           </a:p>
         </p:txBody>
       </p:sp>
@@ -13629,7 +13944,7 @@
           <p:nvPr/>
         </p:nvPicPr>
         <p:blipFill>
-          <a:blip r:embed="rId1">
+          <a:blip r:embed="rId3">
             <a:extLst>
               <a:ext uri="{28A0092B-C50C-407E-A947-70E740481C1C}">
                 <a14:useLocalDpi xmlns:a14="http://schemas.microsoft.com/office/drawing/2010/main" val="0"/>
@@ -13688,7 +14003,7 @@
           <p:nvPr/>
         </p:nvPicPr>
         <p:blipFill>
-          <a:blip r:embed="rId2">
+          <a:blip r:embed="rId4">
             <a:extLst>
               <a:ext uri="{28A0092B-C50C-407E-A947-70E740481C1C}">
                 <a14:useLocalDpi xmlns:a14="http://schemas.microsoft.com/office/drawing/2010/main" val="0"/>
@@ -14240,7 +14555,7 @@
           <p:nvPr/>
         </p:nvPicPr>
         <p:blipFill>
-          <a:blip r:embed="rId1">
+          <a:blip r:embed="rId2">
             <a:extLst>
               <a:ext uri="{28A0092B-C50C-407E-A947-70E740481C1C}">
                 <a14:useLocalDpi xmlns:a14="http://schemas.microsoft.com/office/drawing/2010/main" val="0"/>
@@ -14418,7 +14733,7 @@
           <p:nvPr/>
         </p:nvPicPr>
         <p:blipFill>
-          <a:blip r:embed="rId2">
+          <a:blip r:embed="rId3">
             <a:extLst>
               <a:ext uri="{28A0092B-C50C-407E-A947-70E740481C1C}">
                 <a14:useLocalDpi xmlns:a14="http://schemas.microsoft.com/office/drawing/2010/main" val="0"/>
@@ -14923,7 +15238,6 @@
               <a:rPr lang="en-US" altLang="zh-CN" sz="4720" dirty="0"/>
               <a:t> Copy Constructor</a:t>
             </a:r>
-            <a:endParaRPr lang="en-US" altLang="zh-CN" sz="4720" dirty="0"/>
           </a:p>
         </p:txBody>
       </p:sp>
@@ -15495,7 +15809,7 @@
           <p:nvPr/>
         </p:nvPicPr>
         <p:blipFill>
-          <a:blip r:embed="rId1">
+          <a:blip r:embed="rId3">
             <a:extLst>
               <a:ext uri="{28A0092B-C50C-407E-A947-70E740481C1C}">
                 <a14:useLocalDpi xmlns:a14="http://schemas.microsoft.com/office/drawing/2010/main" val="0"/>
@@ -15961,7 +16275,6 @@
               <a:rPr lang="en-US" altLang="zh-CN" sz="2180" dirty="0"/>
               <a:t>Complex c1 (c2);</a:t>
             </a:r>
-            <a:endParaRPr lang="en-US" altLang="zh-CN" sz="2180" dirty="0"/>
           </a:p>
           <a:p>
             <a:pPr>
@@ -15973,7 +16286,6 @@
               <a:rPr lang="en-US" altLang="zh-CN" sz="2180" dirty="0"/>
               <a:t>Complex c3 = c1;</a:t>
             </a:r>
-            <a:endParaRPr lang="en-US" altLang="zh-CN" sz="2180" dirty="0"/>
           </a:p>
           <a:p>
             <a:pPr>
@@ -15985,7 +16297,6 @@
               <a:rPr lang="en-US" altLang="zh-CN" sz="2180" dirty="0"/>
               <a:t>Complex c4 = Complex(c1);</a:t>
             </a:r>
-            <a:endParaRPr lang="en-US" altLang="zh-CN" sz="2180" dirty="0"/>
           </a:p>
           <a:p>
             <a:pPr>
@@ -16187,21 +16498,18 @@
               <a:rPr lang="en-US" altLang="zh-CN" sz="2400" dirty="0"/>
               <a:t>1. When a class object is returned by value.</a:t>
             </a:r>
-            <a:endParaRPr lang="en-US" altLang="zh-CN" sz="2400" dirty="0"/>
           </a:p>
           <a:p>
             <a:r>
               <a:rPr lang="en-US" altLang="zh-CN" sz="2400" dirty="0"/>
               <a:t>2. When an object is passed to a function as an argument and is passed by value.</a:t>
             </a:r>
-            <a:endParaRPr lang="en-US" altLang="zh-CN" sz="2400" dirty="0"/>
           </a:p>
           <a:p>
             <a:r>
               <a:rPr lang="en-US" altLang="zh-CN" sz="2400" dirty="0"/>
               <a:t>3. When an object is constructed from another object of the same class.</a:t>
             </a:r>
-            <a:endParaRPr lang="en-US" altLang="zh-CN" sz="2400" dirty="0"/>
           </a:p>
           <a:p>
             <a:r>
@@ -16628,7 +16936,6 @@
               <a:rPr lang="en-US" altLang="zh-CN" sz="4000" dirty="0"/>
               <a:t> Assignment Operator</a:t>
             </a:r>
-            <a:endParaRPr lang="en-US" altLang="zh-CN" sz="4000" dirty="0"/>
           </a:p>
         </p:txBody>
       </p:sp>
@@ -16786,11 +17093,6 @@
               </a:rPr>
               <a:t>to free former obligations.</a:t>
             </a:r>
-            <a:endParaRPr lang="en-US" altLang="zh-CN" sz="2200" dirty="0">
-              <a:solidFill>
-                <a:prstClr val="black"/>
-              </a:solidFill>
-            </a:endParaRPr>
           </a:p>
           <a:p>
             <a:pPr marL="311150" indent="-311150">
@@ -16805,11 +17107,6 @@
               </a:rPr>
               <a:t>The function should protect against assigning an object to itself; otherwise, the freeing of memory described previously could erase the object’s contents before they are reassigned.</a:t>
             </a:r>
-            <a:endParaRPr lang="en-US" altLang="zh-CN" sz="2200" dirty="0">
-              <a:solidFill>
-                <a:prstClr val="black"/>
-              </a:solidFill>
-            </a:endParaRPr>
           </a:p>
           <a:p>
             <a:pPr marL="311150" indent="-311150">
@@ -16841,7 +17138,7 @@
           <p:nvPr/>
         </p:nvPicPr>
         <p:blipFill>
-          <a:blip r:embed="rId1">
+          <a:blip r:embed="rId3">
             <a:extLst>
               <a:ext uri="{28A0092B-C50C-407E-A947-70E740481C1C}">
                 <a14:useLocalDpi xmlns:a14="http://schemas.microsoft.com/office/drawing/2010/main" val="0"/>
@@ -18489,6 +18786,8 @@
       </a:bgFillStyleLst>
     </a:fmtScheme>
   </a:themeElements>
+  <a:objectDefaults/>
+  <a:extraClrSchemeLst/>
   <a:extLst>
     <a:ext uri="{05A4C25C-085E-4340-85A3-A5531E510DB2}">
       <thm15:themeFamily xmlns:thm15="http://schemas.microsoft.com/office/thememl/2012/main" name="Office Theme" id="{62F939B6-93AF-4DB8-9C6B-D6C7DFDC589F}" vid="{4A3C46E8-61CC-4603-A589-7422A47A8E4A}"/>
@@ -18748,6 +19047,8 @@
       </a:bgFillStyleLst>
     </a:fmtScheme>
   </a:themeElements>
+  <a:objectDefaults/>
+  <a:extraClrSchemeLst/>
   <a:extLst>
     <a:ext uri="{05A4C25C-085E-4340-85A3-A5531E510DB2}">
       <thm15:themeFamily xmlns:thm15="http://schemas.microsoft.com/office/thememl/2012/main" name="Office Theme" id="{62F939B6-93AF-4DB8-9C6B-D6C7DFDC589F}" vid="{4A3C46E8-61CC-4603-A589-7422A47A8E4A}"/>

</xml_diff>